<commit_message>
downsized pdf figs to png
</commit_message>
<xml_diff>
--- a/figs/other/mouselab_meta-mdp.pptx
+++ b/figs/other/mouselab_meta-mdp.pptx
@@ -4,6 +4,9 @@
   <p:sldMasterIdLst>
     <p:sldMasterId id="2147483792" r:id="rId1"/>
   </p:sldMasterIdLst>
+  <p:notesMasterIdLst>
+    <p:notesMasterId r:id="rId3"/>
+  </p:notesMasterIdLst>
   <p:sldIdLst>
     <p:sldId id="271" r:id="rId2"/>
   </p:sldIdLst>
@@ -123,6 +126,439 @@
 </p:presentation>
 </file>
 
+<file path=ppt/notesMasters/notesMaster1.xml><?xml version="1.0" encoding="utf-8"?>
+<p:notesMaster xmlns:a="http://schemas.openxmlformats.org/drawingml/2006/main" xmlns:r="http://schemas.openxmlformats.org/officeDocument/2006/relationships" xmlns:p="http://schemas.openxmlformats.org/presentationml/2006/main">
+  <p:cSld>
+    <p:bg>
+      <p:bgRef idx="1001">
+        <a:schemeClr val="bg1"/>
+      </p:bgRef>
+    </p:bg>
+    <p:spTree>
+      <p:nvGrpSpPr>
+        <p:cNvPr id="1" name=""/>
+        <p:cNvGrpSpPr/>
+        <p:nvPr/>
+      </p:nvGrpSpPr>
+      <p:grpSpPr>
+        <a:xfrm>
+          <a:off x="0" y="0"/>
+          <a:ext cx="0" cy="0"/>
+          <a:chOff x="0" y="0"/>
+          <a:chExt cx="0" cy="0"/>
+        </a:xfrm>
+      </p:grpSpPr>
+      <p:sp>
+        <p:nvSpPr>
+          <p:cNvPr id="2" name="Header Placeholder 1"/>
+          <p:cNvSpPr>
+            <a:spLocks noGrp="1"/>
+          </p:cNvSpPr>
+          <p:nvPr>
+            <p:ph type="hdr" sz="quarter"/>
+          </p:nvPr>
+        </p:nvSpPr>
+        <p:spPr>
+          <a:xfrm>
+            <a:off x="0" y="0"/>
+            <a:ext cx="2971800" cy="458788"/>
+          </a:xfrm>
+          <a:prstGeom prst="rect">
+            <a:avLst/>
+          </a:prstGeom>
+        </p:spPr>
+        <p:txBody>
+          <a:bodyPr vert="horz" lIns="91440" tIns="45720" rIns="91440" bIns="45720" rtlCol="0"/>
+          <a:lstStyle>
+            <a:lvl1pPr algn="l">
+              <a:defRPr sz="1200"/>
+            </a:lvl1pPr>
+          </a:lstStyle>
+          <a:p>
+            <a:endParaRPr lang="en-US"/>
+          </a:p>
+        </p:txBody>
+      </p:sp>
+      <p:sp>
+        <p:nvSpPr>
+          <p:cNvPr id="3" name="Date Placeholder 2"/>
+          <p:cNvSpPr>
+            <a:spLocks noGrp="1"/>
+          </p:cNvSpPr>
+          <p:nvPr>
+            <p:ph type="dt" idx="1"/>
+          </p:nvPr>
+        </p:nvSpPr>
+        <p:spPr>
+          <a:xfrm>
+            <a:off x="3884613" y="0"/>
+            <a:ext cx="2971800" cy="458788"/>
+          </a:xfrm>
+          <a:prstGeom prst="rect">
+            <a:avLst/>
+          </a:prstGeom>
+        </p:spPr>
+        <p:txBody>
+          <a:bodyPr vert="horz" lIns="91440" tIns="45720" rIns="91440" bIns="45720" rtlCol="0"/>
+          <a:lstStyle>
+            <a:lvl1pPr algn="r">
+              <a:defRPr sz="1200"/>
+            </a:lvl1pPr>
+          </a:lstStyle>
+          <a:p>
+            <a:fld id="{1442C147-0AFC-3442-9C27-BDD1766F8F27}" type="datetimeFigureOut">
+              <a:rPr lang="en-US" smtClean="0"/>
+              <a:t>7/13/22</a:t>
+            </a:fld>
+            <a:endParaRPr lang="en-US"/>
+          </a:p>
+        </p:txBody>
+      </p:sp>
+      <p:sp>
+        <p:nvSpPr>
+          <p:cNvPr id="4" name="Slide Image Placeholder 3"/>
+          <p:cNvSpPr>
+            <a:spLocks noGrp="1" noRot="1" noChangeAspect="1"/>
+          </p:cNvSpPr>
+          <p:nvPr>
+            <p:ph type="sldImg" idx="2"/>
+          </p:nvPr>
+        </p:nvSpPr>
+        <p:spPr>
+          <a:xfrm>
+            <a:off x="-1714500" y="1143000"/>
+            <a:ext cx="10287000" cy="3086100"/>
+          </a:xfrm>
+          <a:prstGeom prst="rect">
+            <a:avLst/>
+          </a:prstGeom>
+          <a:noFill/>
+          <a:ln w="12700">
+            <a:solidFill>
+              <a:prstClr val="black"/>
+            </a:solidFill>
+          </a:ln>
+        </p:spPr>
+        <p:txBody>
+          <a:bodyPr vert="horz" lIns="91440" tIns="45720" rIns="91440" bIns="45720" rtlCol="0" anchor="ctr"/>
+          <a:lstStyle/>
+          <a:p>
+            <a:endParaRPr lang="en-US"/>
+          </a:p>
+        </p:txBody>
+      </p:sp>
+      <p:sp>
+        <p:nvSpPr>
+          <p:cNvPr id="5" name="Notes Placeholder 4"/>
+          <p:cNvSpPr>
+            <a:spLocks noGrp="1"/>
+          </p:cNvSpPr>
+          <p:nvPr>
+            <p:ph type="body" sz="quarter" idx="3"/>
+          </p:nvPr>
+        </p:nvSpPr>
+        <p:spPr>
+          <a:xfrm>
+            <a:off x="685800" y="4400550"/>
+            <a:ext cx="5486400" cy="3600450"/>
+          </a:xfrm>
+          <a:prstGeom prst="rect">
+            <a:avLst/>
+          </a:prstGeom>
+        </p:spPr>
+        <p:txBody>
+          <a:bodyPr vert="horz" lIns="91440" tIns="45720" rIns="91440" bIns="45720" rtlCol="0"/>
+          <a:lstStyle/>
+          <a:p>
+            <a:pPr lvl="0"/>
+            <a:r>
+              <a:rPr lang="en-US"/>
+              <a:t>Edit Master text styles</a:t>
+            </a:r>
+          </a:p>
+          <a:p>
+            <a:pPr lvl="1"/>
+            <a:r>
+              <a:rPr lang="en-US"/>
+              <a:t>Second level</a:t>
+            </a:r>
+          </a:p>
+          <a:p>
+            <a:pPr lvl="2"/>
+            <a:r>
+              <a:rPr lang="en-US"/>
+              <a:t>Third level</a:t>
+            </a:r>
+          </a:p>
+          <a:p>
+            <a:pPr lvl="3"/>
+            <a:r>
+              <a:rPr lang="en-US"/>
+              <a:t>Fourth level</a:t>
+            </a:r>
+          </a:p>
+          <a:p>
+            <a:pPr lvl="4"/>
+            <a:r>
+              <a:rPr lang="en-US"/>
+              <a:t>Fifth level</a:t>
+            </a:r>
+          </a:p>
+        </p:txBody>
+      </p:sp>
+      <p:sp>
+        <p:nvSpPr>
+          <p:cNvPr id="6" name="Footer Placeholder 5"/>
+          <p:cNvSpPr>
+            <a:spLocks noGrp="1"/>
+          </p:cNvSpPr>
+          <p:nvPr>
+            <p:ph type="ftr" sz="quarter" idx="4"/>
+          </p:nvPr>
+        </p:nvSpPr>
+        <p:spPr>
+          <a:xfrm>
+            <a:off x="0" y="8685213"/>
+            <a:ext cx="2971800" cy="458787"/>
+          </a:xfrm>
+          <a:prstGeom prst="rect">
+            <a:avLst/>
+          </a:prstGeom>
+        </p:spPr>
+        <p:txBody>
+          <a:bodyPr vert="horz" lIns="91440" tIns="45720" rIns="91440" bIns="45720" rtlCol="0" anchor="b"/>
+          <a:lstStyle>
+            <a:lvl1pPr algn="l">
+              <a:defRPr sz="1200"/>
+            </a:lvl1pPr>
+          </a:lstStyle>
+          <a:p>
+            <a:endParaRPr lang="en-US"/>
+          </a:p>
+        </p:txBody>
+      </p:sp>
+      <p:sp>
+        <p:nvSpPr>
+          <p:cNvPr id="7" name="Slide Number Placeholder 6"/>
+          <p:cNvSpPr>
+            <a:spLocks noGrp="1"/>
+          </p:cNvSpPr>
+          <p:nvPr>
+            <p:ph type="sldNum" sz="quarter" idx="5"/>
+          </p:nvPr>
+        </p:nvSpPr>
+        <p:spPr>
+          <a:xfrm>
+            <a:off x="3884613" y="8685213"/>
+            <a:ext cx="2971800" cy="458787"/>
+          </a:xfrm>
+          <a:prstGeom prst="rect">
+            <a:avLst/>
+          </a:prstGeom>
+        </p:spPr>
+        <p:txBody>
+          <a:bodyPr vert="horz" lIns="91440" tIns="45720" rIns="91440" bIns="45720" rtlCol="0" anchor="b"/>
+          <a:lstStyle>
+            <a:lvl1pPr algn="r">
+              <a:defRPr sz="1200"/>
+            </a:lvl1pPr>
+          </a:lstStyle>
+          <a:p>
+            <a:fld id="{CB2CAFE0-4B4C-0049-A855-08E14E4950AF}" type="slidenum">
+              <a:rPr lang="en-US" smtClean="0"/>
+              <a:t>‹#›</a:t>
+            </a:fld>
+            <a:endParaRPr lang="en-US"/>
+          </a:p>
+        </p:txBody>
+      </p:sp>
+    </p:spTree>
+    <p:extLst>
+      <p:ext uri="{BB962C8B-B14F-4D97-AF65-F5344CB8AC3E}">
+        <p14:creationId xmlns:p14="http://schemas.microsoft.com/office/powerpoint/2010/main" val="3410656157"/>
+      </p:ext>
+    </p:extLst>
+  </p:cSld>
+  <p:clrMap bg1="lt1" tx1="dk1" bg2="lt2" tx2="dk2" accent1="accent1" accent2="accent2" accent3="accent3" accent4="accent4" accent5="accent5" accent6="accent6" hlink="hlink" folHlink="folHlink"/>
+  <p:notesStyle>
+    <a:lvl1pPr marL="0" algn="l" defTabSz="914400" rtl="0" eaLnBrk="1" latinLnBrk="0" hangingPunct="1">
+      <a:defRPr sz="1200" kern="1200">
+        <a:solidFill>
+          <a:schemeClr val="tx1"/>
+        </a:solidFill>
+        <a:latin typeface="+mn-lt"/>
+        <a:ea typeface="+mn-ea"/>
+        <a:cs typeface="+mn-cs"/>
+      </a:defRPr>
+    </a:lvl1pPr>
+    <a:lvl2pPr marL="457200" algn="l" defTabSz="914400" rtl="0" eaLnBrk="1" latinLnBrk="0" hangingPunct="1">
+      <a:defRPr sz="1200" kern="1200">
+        <a:solidFill>
+          <a:schemeClr val="tx1"/>
+        </a:solidFill>
+        <a:latin typeface="+mn-lt"/>
+        <a:ea typeface="+mn-ea"/>
+        <a:cs typeface="+mn-cs"/>
+      </a:defRPr>
+    </a:lvl2pPr>
+    <a:lvl3pPr marL="914400" algn="l" defTabSz="914400" rtl="0" eaLnBrk="1" latinLnBrk="0" hangingPunct="1">
+      <a:defRPr sz="1200" kern="1200">
+        <a:solidFill>
+          <a:schemeClr val="tx1"/>
+        </a:solidFill>
+        <a:latin typeface="+mn-lt"/>
+        <a:ea typeface="+mn-ea"/>
+        <a:cs typeface="+mn-cs"/>
+      </a:defRPr>
+    </a:lvl3pPr>
+    <a:lvl4pPr marL="1371600" algn="l" defTabSz="914400" rtl="0" eaLnBrk="1" latinLnBrk="0" hangingPunct="1">
+      <a:defRPr sz="1200" kern="1200">
+        <a:solidFill>
+          <a:schemeClr val="tx1"/>
+        </a:solidFill>
+        <a:latin typeface="+mn-lt"/>
+        <a:ea typeface="+mn-ea"/>
+        <a:cs typeface="+mn-cs"/>
+      </a:defRPr>
+    </a:lvl4pPr>
+    <a:lvl5pPr marL="1828800" algn="l" defTabSz="914400" rtl="0" eaLnBrk="1" latinLnBrk="0" hangingPunct="1">
+      <a:defRPr sz="1200" kern="1200">
+        <a:solidFill>
+          <a:schemeClr val="tx1"/>
+        </a:solidFill>
+        <a:latin typeface="+mn-lt"/>
+        <a:ea typeface="+mn-ea"/>
+        <a:cs typeface="+mn-cs"/>
+      </a:defRPr>
+    </a:lvl5pPr>
+    <a:lvl6pPr marL="2286000" algn="l" defTabSz="914400" rtl="0" eaLnBrk="1" latinLnBrk="0" hangingPunct="1">
+      <a:defRPr sz="1200" kern="1200">
+        <a:solidFill>
+          <a:schemeClr val="tx1"/>
+        </a:solidFill>
+        <a:latin typeface="+mn-lt"/>
+        <a:ea typeface="+mn-ea"/>
+        <a:cs typeface="+mn-cs"/>
+      </a:defRPr>
+    </a:lvl6pPr>
+    <a:lvl7pPr marL="2743200" algn="l" defTabSz="914400" rtl="0" eaLnBrk="1" latinLnBrk="0" hangingPunct="1">
+      <a:defRPr sz="1200" kern="1200">
+        <a:solidFill>
+          <a:schemeClr val="tx1"/>
+        </a:solidFill>
+        <a:latin typeface="+mn-lt"/>
+        <a:ea typeface="+mn-ea"/>
+        <a:cs typeface="+mn-cs"/>
+      </a:defRPr>
+    </a:lvl7pPr>
+    <a:lvl8pPr marL="3200400" algn="l" defTabSz="914400" rtl="0" eaLnBrk="1" latinLnBrk="0" hangingPunct="1">
+      <a:defRPr sz="1200" kern="1200">
+        <a:solidFill>
+          <a:schemeClr val="tx1"/>
+        </a:solidFill>
+        <a:latin typeface="+mn-lt"/>
+        <a:ea typeface="+mn-ea"/>
+        <a:cs typeface="+mn-cs"/>
+      </a:defRPr>
+    </a:lvl8pPr>
+    <a:lvl9pPr marL="3657600" algn="l" defTabSz="914400" rtl="0" eaLnBrk="1" latinLnBrk="0" hangingPunct="1">
+      <a:defRPr sz="1200" kern="1200">
+        <a:solidFill>
+          <a:schemeClr val="tx1"/>
+        </a:solidFill>
+        <a:latin typeface="+mn-lt"/>
+        <a:ea typeface="+mn-ea"/>
+        <a:cs typeface="+mn-cs"/>
+      </a:defRPr>
+    </a:lvl9pPr>
+  </p:notesStyle>
+</p:notesMaster>
+</file>
+
+<file path=ppt/notesSlides/notesSlide1.xml><?xml version="1.0" encoding="utf-8"?>
+<p:notes xmlns:a="http://schemas.openxmlformats.org/drawingml/2006/main" xmlns:r="http://schemas.openxmlformats.org/officeDocument/2006/relationships" xmlns:p="http://schemas.openxmlformats.org/presentationml/2006/main">
+  <p:cSld>
+    <p:spTree>
+      <p:nvGrpSpPr>
+        <p:cNvPr id="1" name=""/>
+        <p:cNvGrpSpPr/>
+        <p:nvPr/>
+      </p:nvGrpSpPr>
+      <p:grpSpPr>
+        <a:xfrm>
+          <a:off x="0" y="0"/>
+          <a:ext cx="0" cy="0"/>
+          <a:chOff x="0" y="0"/>
+          <a:chExt cx="0" cy="0"/>
+        </a:xfrm>
+      </p:grpSpPr>
+      <p:sp>
+        <p:nvSpPr>
+          <p:cNvPr id="2" name="Slide Image Placeholder 1"/>
+          <p:cNvSpPr>
+            <a:spLocks noGrp="1" noRot="1" noChangeAspect="1"/>
+          </p:cNvSpPr>
+          <p:nvPr>
+            <p:ph type="sldImg"/>
+          </p:nvPr>
+        </p:nvSpPr>
+        <p:spPr/>
+      </p:sp>
+      <p:sp>
+        <p:nvSpPr>
+          <p:cNvPr id="3" name="Notes Placeholder 2"/>
+          <p:cNvSpPr>
+            <a:spLocks noGrp="1"/>
+          </p:cNvSpPr>
+          <p:nvPr>
+            <p:ph type="body" idx="1"/>
+          </p:nvPr>
+        </p:nvSpPr>
+        <p:spPr/>
+        <p:txBody>
+          <a:bodyPr/>
+          <a:lstStyle/>
+          <a:p>
+            <a:endParaRPr lang="en-US"/>
+          </a:p>
+        </p:txBody>
+      </p:sp>
+      <p:sp>
+        <p:nvSpPr>
+          <p:cNvPr id="4" name="Slide Number Placeholder 3"/>
+          <p:cNvSpPr>
+            <a:spLocks noGrp="1"/>
+          </p:cNvSpPr>
+          <p:nvPr>
+            <p:ph type="sldNum" sz="quarter" idx="5"/>
+          </p:nvPr>
+        </p:nvSpPr>
+        <p:spPr/>
+        <p:txBody>
+          <a:bodyPr/>
+          <a:lstStyle/>
+          <a:p>
+            <a:fld id="{CB2CAFE0-4B4C-0049-A855-08E14E4950AF}" type="slidenum">
+              <a:rPr lang="en-US" smtClean="0"/>
+              <a:t>1</a:t>
+            </a:fld>
+            <a:endParaRPr lang="en-US"/>
+          </a:p>
+        </p:txBody>
+      </p:sp>
+    </p:spTree>
+    <p:extLst>
+      <p:ext uri="{BB962C8B-B14F-4D97-AF65-F5344CB8AC3E}">
+        <p14:creationId xmlns:p14="http://schemas.microsoft.com/office/powerpoint/2010/main" val="713638446"/>
+      </p:ext>
+    </p:extLst>
+  </p:cSld>
+  <p:clrMapOvr>
+    <a:masterClrMapping/>
+  </p:clrMapOvr>
+</p:notes>
+</file>
+
 <file path=ppt/slideLayouts/slideLayout1.xml><?xml version="1.0" encoding="utf-8"?>
 <p:sldLayout xmlns:a="http://schemas.openxmlformats.org/drawingml/2006/main" xmlns:r="http://schemas.openxmlformats.org/officeDocument/2006/relationships" xmlns:p="http://schemas.openxmlformats.org/presentationml/2006/main" type="title" preserve="1">
   <p:cSld name="Title Slide">
@@ -254,7 +690,7 @@
           <a:p>
             <a:fld id="{3913361B-3EF1-C247-9E4E-4E66352D7B43}" type="datetimeFigureOut">
               <a:rPr lang="en-US" smtClean="0"/>
-              <a:t>7/15/21</a:t>
+              <a:t>7/13/22</a:t>
             </a:fld>
             <a:endParaRPr lang="en-US"/>
           </a:p>
@@ -424,7 +860,7 @@
           <a:p>
             <a:fld id="{3913361B-3EF1-C247-9E4E-4E66352D7B43}" type="datetimeFigureOut">
               <a:rPr lang="en-US" smtClean="0"/>
-              <a:t>7/15/21</a:t>
+              <a:t>7/13/22</a:t>
             </a:fld>
             <a:endParaRPr lang="en-US"/>
           </a:p>
@@ -604,7 +1040,7 @@
           <a:p>
             <a:fld id="{3913361B-3EF1-C247-9E4E-4E66352D7B43}" type="datetimeFigureOut">
               <a:rPr lang="en-US" smtClean="0"/>
-              <a:t>7/15/21</a:t>
+              <a:t>7/13/22</a:t>
             </a:fld>
             <a:endParaRPr lang="en-US"/>
           </a:p>
@@ -774,7 +1210,7 @@
           <a:p>
             <a:fld id="{3913361B-3EF1-C247-9E4E-4E66352D7B43}" type="datetimeFigureOut">
               <a:rPr lang="en-US" smtClean="0"/>
-              <a:t>7/15/21</a:t>
+              <a:t>7/13/22</a:t>
             </a:fld>
             <a:endParaRPr lang="en-US"/>
           </a:p>
@@ -1020,7 +1456,7 @@
           <a:p>
             <a:fld id="{3913361B-3EF1-C247-9E4E-4E66352D7B43}" type="datetimeFigureOut">
               <a:rPr lang="en-US" smtClean="0"/>
-              <a:t>7/15/21</a:t>
+              <a:t>7/13/22</a:t>
             </a:fld>
             <a:endParaRPr lang="en-US"/>
           </a:p>
@@ -1252,7 +1688,7 @@
           <a:p>
             <a:fld id="{3913361B-3EF1-C247-9E4E-4E66352D7B43}" type="datetimeFigureOut">
               <a:rPr lang="en-US" smtClean="0"/>
-              <a:t>7/15/21</a:t>
+              <a:t>7/13/22</a:t>
             </a:fld>
             <a:endParaRPr lang="en-US"/>
           </a:p>
@@ -1619,7 +2055,7 @@
           <a:p>
             <a:fld id="{3913361B-3EF1-C247-9E4E-4E66352D7B43}" type="datetimeFigureOut">
               <a:rPr lang="en-US" smtClean="0"/>
-              <a:t>7/15/21</a:t>
+              <a:t>7/13/22</a:t>
             </a:fld>
             <a:endParaRPr lang="en-US"/>
           </a:p>
@@ -1737,7 +2173,7 @@
           <a:p>
             <a:fld id="{3913361B-3EF1-C247-9E4E-4E66352D7B43}" type="datetimeFigureOut">
               <a:rPr lang="en-US" smtClean="0"/>
-              <a:t>7/15/21</a:t>
+              <a:t>7/13/22</a:t>
             </a:fld>
             <a:endParaRPr lang="en-US"/>
           </a:p>
@@ -1832,7 +2268,7 @@
           <a:p>
             <a:fld id="{3913361B-3EF1-C247-9E4E-4E66352D7B43}" type="datetimeFigureOut">
               <a:rPr lang="en-US" smtClean="0"/>
-              <a:t>7/15/21</a:t>
+              <a:t>7/13/22</a:t>
             </a:fld>
             <a:endParaRPr lang="en-US"/>
           </a:p>
@@ -2109,7 +2545,7 @@
           <a:p>
             <a:fld id="{3913361B-3EF1-C247-9E4E-4E66352D7B43}" type="datetimeFigureOut">
               <a:rPr lang="en-US" smtClean="0"/>
-              <a:t>7/15/21</a:t>
+              <a:t>7/13/22</a:t>
             </a:fld>
             <a:endParaRPr lang="en-US"/>
           </a:p>
@@ -2366,7 +2802,7 @@
           <a:p>
             <a:fld id="{3913361B-3EF1-C247-9E4E-4E66352D7B43}" type="datetimeFigureOut">
               <a:rPr lang="en-US" smtClean="0"/>
-              <a:t>7/15/21</a:t>
+              <a:t>7/13/22</a:t>
             </a:fld>
             <a:endParaRPr lang="en-US"/>
           </a:p>
@@ -2579,7 +3015,7 @@
           <a:p>
             <a:fld id="{3913361B-3EF1-C247-9E4E-4E66352D7B43}" type="datetimeFigureOut">
               <a:rPr lang="en-US" smtClean="0"/>
-              <a:t>7/15/21</a:t>
+              <a:t>7/13/22</a:t>
             </a:fld>
             <a:endParaRPr lang="en-US"/>
           </a:p>
@@ -2998,7 +3434,7 @@
         </p:nvSpPr>
         <p:spPr>
           <a:xfrm>
-            <a:off x="15787607" y="1514505"/>
+            <a:off x="15768111" y="1514505"/>
             <a:ext cx="2103120" cy="2103120"/>
           </a:xfrm>
           <a:prstGeom prst="ellipse">
@@ -3059,7 +3495,7 @@
         </p:nvSpPr>
         <p:spPr>
           <a:xfrm>
-            <a:off x="13406291" y="3395093"/>
+            <a:off x="13391582" y="3395093"/>
             <a:ext cx="1828800" cy="1828800"/>
           </a:xfrm>
           <a:prstGeom prst="rect">
@@ -3122,7 +3558,7 @@
         </p:nvCxnSpPr>
         <p:spPr>
           <a:xfrm>
-            <a:off x="12750916" y="3419966"/>
+            <a:off x="12733357" y="3415490"/>
             <a:ext cx="628316" cy="630936"/>
           </a:xfrm>
           <a:prstGeom prst="straightConnector1">
@@ -3166,7 +3602,7 @@
         </p:nvCxnSpPr>
         <p:spPr>
           <a:xfrm flipV="1">
-            <a:off x="14151503" y="1567337"/>
+            <a:off x="14141581" y="1567337"/>
             <a:ext cx="569471" cy="1827757"/>
           </a:xfrm>
           <a:prstGeom prst="straightConnector1">
@@ -3208,7 +3644,7 @@
         </p:nvSpPr>
         <p:spPr>
           <a:xfrm>
-            <a:off x="11015409" y="1512684"/>
+            <a:off x="11053513" y="1512684"/>
             <a:ext cx="2103120" cy="2103120"/>
           </a:xfrm>
           <a:prstGeom prst="ellipse">
@@ -3269,7 +3705,7 @@
         </p:nvSpPr>
         <p:spPr>
           <a:xfrm>
-            <a:off x="5057240" y="1518788"/>
+            <a:off x="5114492" y="1518788"/>
             <a:ext cx="2103120" cy="2103120"/>
           </a:xfrm>
           <a:prstGeom prst="ellipse">
@@ -3330,7 +3766,7 @@
         </p:nvSpPr>
         <p:spPr>
           <a:xfrm>
-            <a:off x="2697578" y="3395093"/>
+            <a:off x="2730739" y="3395093"/>
             <a:ext cx="1828800" cy="1828800"/>
           </a:xfrm>
           <a:prstGeom prst="rect">
@@ -3391,7 +3827,7 @@
         </p:nvSpPr>
         <p:spPr>
           <a:xfrm>
-            <a:off x="348177" y="1518788"/>
+            <a:off x="386281" y="1518788"/>
             <a:ext cx="2103120" cy="2103120"/>
           </a:xfrm>
           <a:prstGeom prst="ellipse">
@@ -3452,7 +3888,7 @@
         </p:nvGrpSpPr>
         <p:grpSpPr>
           <a:xfrm>
-            <a:off x="2772697" y="3821418"/>
+            <a:off x="2805858" y="3821418"/>
             <a:ext cx="1680588" cy="1009428"/>
             <a:chOff x="656211" y="3342411"/>
             <a:chExt cx="1680588" cy="1009428"/>
@@ -3557,7 +3993,7 @@
                     <p:nvPr/>
                   </p:nvPicPr>
                   <p:blipFill>
-                    <a:blip r:embed="rId2"/>
+                    <a:blip r:embed="rId3"/>
                     <a:stretch>
                       <a:fillRect/>
                     </a:stretch>
@@ -3587,7 +4023,7 @@
                     <p:nvPr/>
                   </p:nvPicPr>
                   <p:blipFill rotWithShape="1">
-                    <a:blip r:embed="rId3"/>
+                    <a:blip r:embed="rId4"/>
                     <a:srcRect l="28579" t="79553" r="57039"/>
                     <a:stretch/>
                   </p:blipFill>
@@ -3617,14 +4053,14 @@
                   <p:nvPr/>
                 </p:nvPicPr>
                 <p:blipFill rotWithShape="1">
-                  <a:blip r:embed="rId2"/>
-                  <a:srcRect l="57199" t="40263" r="28896" b="40475"/>
+                  <a:blip r:embed="rId3"/>
+                  <a:srcRect l="57276" t="40421" r="28896" b="40475"/>
                   <a:stretch/>
                 </p:blipFill>
                 <p:spPr>
                   <a:xfrm>
-                    <a:off x="2160439" y="1750195"/>
-                    <a:ext cx="292101" cy="219075"/>
+                    <a:off x="2162044" y="1750209"/>
+                    <a:ext cx="290496" cy="217279"/>
                   </a:xfrm>
                   <a:prstGeom prst="rect">
                     <a:avLst/>
@@ -3647,14 +4083,14 @@
                 <p:nvPr/>
               </p:nvPicPr>
               <p:blipFill rotWithShape="1">
-                <a:blip r:embed="rId2"/>
-                <a:srcRect l="57199" t="40263" r="28896" b="40475"/>
+                <a:blip r:embed="rId3"/>
+                <a:srcRect l="57199" t="40023" r="28896" b="40475"/>
                 <a:stretch/>
               </p:blipFill>
               <p:spPr>
                 <a:xfrm>
-                  <a:off x="2011779" y="1902595"/>
-                  <a:ext cx="292101" cy="219075"/>
+                  <a:off x="2011779" y="1898084"/>
+                  <a:ext cx="292101" cy="221805"/>
                 </a:xfrm>
                 <a:prstGeom prst="rect">
                   <a:avLst/>
@@ -3677,7 +4113,7 @@
               <p:nvPr/>
             </p:nvPicPr>
             <p:blipFill rotWithShape="1">
-              <a:blip r:embed="rId2"/>
+              <a:blip r:embed="rId3"/>
               <a:srcRect l="57199" t="40263" r="28896" b="40475"/>
               <a:stretch/>
             </p:blipFill>
@@ -3707,7 +4143,7 @@
             <p:nvPr/>
           </p:nvPicPr>
           <p:blipFill>
-            <a:blip r:embed="rId4"/>
+            <a:blip r:embed="rId5"/>
             <a:stretch>
               <a:fillRect/>
             </a:stretch>
@@ -3722,8 +4158,8 @@
             </a:prstGeom>
           </p:spPr>
         </p:pic>
-        <mc:AlternateContent xmlns:mc="http://schemas.openxmlformats.org/markup-compatibility/2006">
-          <mc:Choice xmlns:a14="http://schemas.microsoft.com/office/drawing/2010/main" Requires="a14">
+        <mc:AlternateContent xmlns:mc="http://schemas.openxmlformats.org/markup-compatibility/2006" xmlns:a14="http://schemas.microsoft.com/office/drawing/2010/main">
+          <mc:Choice Requires="a14">
             <p:sp>
               <p:nvSpPr>
                 <p:cNvPr id="63" name="TextBox 62">
@@ -3792,7 +4228,7 @@
               </p:txBody>
             </p:sp>
           </mc:Choice>
-          <mc:Fallback>
+          <mc:Fallback xmlns="">
             <p:sp>
               <p:nvSpPr>
                 <p:cNvPr id="63" name="TextBox 62">
@@ -3816,7 +4252,7 @@
                   <a:avLst/>
                 </a:prstGeom>
                 <a:blipFill>
-                  <a:blip r:embed="rId5"/>
+                  <a:blip r:embed="rId6"/>
                   <a:stretch>
                     <a:fillRect l="-7895" r="-5263" b="-15385"/>
                   </a:stretch>
@@ -3852,7 +4288,7 @@
         </p:nvGrpSpPr>
         <p:grpSpPr>
           <a:xfrm>
-            <a:off x="3664361" y="434680"/>
+            <a:off x="3702465" y="434680"/>
             <a:ext cx="1069848" cy="1069848"/>
             <a:chOff x="9925705" y="2389328"/>
             <a:chExt cx="1069848" cy="1069848"/>
@@ -4013,7 +4449,7 @@
                   <a:avLst/>
                 </a:prstGeom>
                 <a:blipFill>
-                  <a:blip r:embed="rId6"/>
+                  <a:blip r:embed="rId7"/>
                   <a:stretch>
                     <a:fillRect l="-3659" r="-1220" b="-15000"/>
                   </a:stretch>
@@ -4051,7 +4487,7 @@
         </p:nvCxnSpPr>
         <p:spPr>
           <a:xfrm>
-            <a:off x="2422223" y="2538838"/>
+            <a:off x="2474688" y="2538838"/>
             <a:ext cx="2609619" cy="0"/>
           </a:xfrm>
           <a:prstGeom prst="straightConnector1">
@@ -4095,7 +4531,7 @@
         </p:nvCxnSpPr>
         <p:spPr>
           <a:xfrm>
-            <a:off x="2042203" y="3419966"/>
+            <a:off x="2075520" y="3419966"/>
             <a:ext cx="628316" cy="630936"/>
           </a:xfrm>
           <a:prstGeom prst="straightConnector1">
@@ -4137,7 +4573,7 @@
         </p:nvSpPr>
         <p:spPr>
           <a:xfrm rot="18900000">
-            <a:off x="14360923" y="413251"/>
+            <a:off x="14365266" y="432303"/>
             <a:ext cx="1069848" cy="1069848"/>
           </a:xfrm>
           <a:prstGeom prst="rect">
@@ -4184,8 +4620,8 @@
           </a:p>
         </p:txBody>
       </p:sp>
-      <mc:AlternateContent xmlns:mc="http://schemas.openxmlformats.org/markup-compatibility/2006" xmlns:a14="http://schemas.microsoft.com/office/drawing/2010/main">
-        <mc:Choice Requires="a14">
+      <mc:AlternateContent xmlns:mc="http://schemas.openxmlformats.org/markup-compatibility/2006">
+        <mc:Choice xmlns:a14="http://schemas.microsoft.com/office/drawing/2010/main" Requires="a14">
           <p:sp>
             <p:nvSpPr>
               <p:cNvPr id="376" name="TextBox 375">
@@ -4200,7 +4636,7 @@
             </p:nvSpPr>
             <p:spPr>
               <a:xfrm>
-                <a:off x="16626034" y="1489075"/>
+                <a:off x="16606538" y="1489075"/>
                 <a:ext cx="500778" cy="492443"/>
               </a:xfrm>
               <a:prstGeom prst="rect">
@@ -4255,7 +4691,7 @@
             </p:txBody>
           </p:sp>
         </mc:Choice>
-        <mc:Fallback xmlns="">
+        <mc:Fallback>
           <p:sp>
             <p:nvSpPr>
               <p:cNvPr id="376" name="TextBox 375">
@@ -4272,16 +4708,16 @@
             </p:nvSpPr>
             <p:spPr>
               <a:xfrm>
-                <a:off x="16626034" y="1489075"/>
+                <a:off x="16606538" y="1489075"/>
                 <a:ext cx="500778" cy="492443"/>
               </a:xfrm>
               <a:prstGeom prst="rect">
                 <a:avLst/>
               </a:prstGeom>
               <a:blipFill>
-                <a:blip r:embed="rId7"/>
+                <a:blip r:embed="rId8"/>
                 <a:stretch>
-                  <a:fillRect l="-7317" r="-2439" b="-10000"/>
+                  <a:fillRect l="-12821" r="-5128" b="-10000"/>
                 </a:stretch>
               </a:blipFill>
             </p:spPr>
@@ -4300,8 +4736,8 @@
           </p:sp>
         </mc:Fallback>
       </mc:AlternateContent>
-      <mc:AlternateContent xmlns:mc="http://schemas.openxmlformats.org/markup-compatibility/2006" xmlns:a14="http://schemas.microsoft.com/office/drawing/2010/main">
-        <mc:Choice Requires="a14">
+      <mc:AlternateContent xmlns:mc="http://schemas.openxmlformats.org/markup-compatibility/2006">
+        <mc:Choice xmlns:a14="http://schemas.microsoft.com/office/drawing/2010/main" Requires="a14">
           <p:sp>
             <p:nvSpPr>
               <p:cNvPr id="386" name="TextBox 385">
@@ -4316,7 +4752,7 @@
             </p:nvSpPr>
             <p:spPr>
               <a:xfrm>
-                <a:off x="14792219" y="659199"/>
+                <a:off x="14796562" y="678251"/>
                 <a:ext cx="166969" cy="492443"/>
               </a:xfrm>
               <a:prstGeom prst="rect">
@@ -4351,7 +4787,7 @@
             </p:txBody>
           </p:sp>
         </mc:Choice>
-        <mc:Fallback xmlns="">
+        <mc:Fallback>
           <p:sp>
             <p:nvSpPr>
               <p:cNvPr id="386" name="TextBox 385">
@@ -4368,16 +4804,16 @@
             </p:nvSpPr>
             <p:spPr>
               <a:xfrm>
-                <a:off x="14792219" y="659199"/>
+                <a:off x="14796562" y="678251"/>
                 <a:ext cx="166969" cy="492443"/>
               </a:xfrm>
               <a:prstGeom prst="rect">
                 <a:avLst/>
               </a:prstGeom>
               <a:blipFill>
-                <a:blip r:embed="rId8"/>
+                <a:blip r:embed="rId9"/>
                 <a:stretch>
-                  <a:fillRect l="-57143" r="-64286"/>
+                  <a:fillRect l="-50000" r="-71429"/>
                 </a:stretch>
               </a:blipFill>
             </p:spPr>
@@ -4410,7 +4846,7 @@
         </p:nvGrpSpPr>
         <p:grpSpPr>
           <a:xfrm>
-            <a:off x="13490649" y="3818511"/>
+            <a:off x="13475940" y="3818511"/>
             <a:ext cx="1675354" cy="907085"/>
             <a:chOff x="1197234" y="14329953"/>
             <a:chExt cx="1675354" cy="907085"/>
@@ -4453,7 +4889,7 @@
               <p:nvPr/>
             </p:nvPicPr>
             <p:blipFill>
-              <a:blip r:embed="rId2"/>
+              <a:blip r:embed="rId3"/>
               <a:stretch>
                 <a:fillRect/>
               </a:stretch>
@@ -4483,7 +4919,7 @@
               <p:nvPr/>
             </p:nvPicPr>
             <p:blipFill rotWithShape="1">
-              <a:blip r:embed="rId3"/>
+              <a:blip r:embed="rId4"/>
               <a:srcRect l="28579" t="79553" r="57039"/>
               <a:stretch/>
             </p:blipFill>
@@ -4513,7 +4949,7 @@
             <p:nvPr/>
           </p:nvPicPr>
           <p:blipFill rotWithShape="1">
-            <a:blip r:embed="rId3"/>
+            <a:blip r:embed="rId4"/>
             <a:srcRect l="57222" t="20338" r="28746" b="60144"/>
             <a:stretch/>
           </p:blipFill>
@@ -4543,14 +4979,14 @@
           <p:nvPr/>
         </p:nvPicPr>
         <p:blipFill>
-          <a:blip r:embed="rId4"/>
+          <a:blip r:embed="rId5"/>
           <a:stretch>
             <a:fillRect/>
           </a:stretch>
         </p:blipFill>
         <p:spPr>
           <a:xfrm>
-            <a:off x="14319089" y="3833881"/>
+            <a:off x="14304380" y="3833881"/>
             <a:ext cx="143256" cy="297180"/>
           </a:xfrm>
           <a:prstGeom prst="rect">
@@ -4558,8 +4994,8 @@
           </a:prstGeom>
         </p:spPr>
       </p:pic>
-      <mc:AlternateContent xmlns:mc="http://schemas.openxmlformats.org/markup-compatibility/2006" xmlns:a14="http://schemas.microsoft.com/office/drawing/2010/main">
-        <mc:Choice Requires="a14">
+      <mc:AlternateContent xmlns:mc="http://schemas.openxmlformats.org/markup-compatibility/2006">
+        <mc:Choice xmlns:a14="http://schemas.microsoft.com/office/drawing/2010/main" Requires="a14">
           <p:sp>
             <p:nvSpPr>
               <p:cNvPr id="410" name="TextBox 409">
@@ -4574,7 +5010,7 @@
             </p:nvSpPr>
             <p:spPr>
               <a:xfrm>
-                <a:off x="14385592" y="3954781"/>
+                <a:off x="14370883" y="3954781"/>
                 <a:ext cx="1559145" cy="530402"/>
               </a:xfrm>
               <a:prstGeom prst="rect">
@@ -4635,7 +5071,7 @@
             </p:txBody>
           </p:sp>
         </mc:Choice>
-        <mc:Fallback xmlns="">
+        <mc:Fallback>
           <p:sp>
             <p:nvSpPr>
               <p:cNvPr id="410" name="TextBox 409">
@@ -4652,14 +5088,14 @@
             </p:nvSpPr>
             <p:spPr>
               <a:xfrm>
-                <a:off x="14385592" y="3954781"/>
+                <a:off x="14370883" y="3954781"/>
                 <a:ext cx="1559145" cy="530402"/>
               </a:xfrm>
               <a:prstGeom prst="rect">
                 <a:avLst/>
               </a:prstGeom>
               <a:blipFill>
-                <a:blip r:embed="rId9"/>
+                <a:blip r:embed="rId10"/>
                 <a:stretch>
                   <a:fillRect l="-4878" r="-4065" b="-23256"/>
                 </a:stretch>
@@ -4694,7 +5130,7 @@
         </p:nvGrpSpPr>
         <p:grpSpPr>
           <a:xfrm>
-            <a:off x="16011869" y="2222557"/>
+            <a:off x="15992373" y="2222557"/>
             <a:ext cx="1675354" cy="907085"/>
             <a:chOff x="1197234" y="14329953"/>
             <a:chExt cx="1675354" cy="907085"/>
@@ -4737,7 +5173,7 @@
               <p:nvPr/>
             </p:nvPicPr>
             <p:blipFill>
-              <a:blip r:embed="rId2"/>
+              <a:blip r:embed="rId3"/>
               <a:stretch>
                 <a:fillRect/>
               </a:stretch>
@@ -4767,7 +5203,7 @@
               <p:nvPr/>
             </p:nvPicPr>
             <p:blipFill rotWithShape="1">
-              <a:blip r:embed="rId3"/>
+              <a:blip r:embed="rId4"/>
               <a:srcRect l="28579" t="79553" r="57039"/>
               <a:stretch/>
             </p:blipFill>
@@ -4797,7 +5233,7 @@
             <p:nvPr/>
           </p:nvPicPr>
           <p:blipFill rotWithShape="1">
-            <a:blip r:embed="rId3"/>
+            <a:blip r:embed="rId4"/>
             <a:srcRect l="57222" t="20338" r="28746" b="60144"/>
             <a:stretch/>
           </p:blipFill>
@@ -4826,7 +5262,7 @@
         </p:nvSpPr>
         <p:spPr>
           <a:xfrm>
-            <a:off x="16011871" y="1988552"/>
+            <a:off x="15992375" y="1988552"/>
             <a:ext cx="1731115" cy="307777"/>
           </a:xfrm>
           <a:prstGeom prst="rect">
@@ -4863,7 +5299,7 @@
         </p:nvSpPr>
         <p:spPr>
           <a:xfrm>
-            <a:off x="16728986" y="2588529"/>
+            <a:off x="16709490" y="2588529"/>
             <a:ext cx="241698" cy="181743"/>
           </a:xfrm>
           <a:prstGeom prst="rect">
@@ -4920,7 +5356,7 @@
         </p:nvSpPr>
         <p:spPr>
           <a:xfrm>
-            <a:off x="9980258" y="2188865"/>
+            <a:off x="10018362" y="2188865"/>
             <a:ext cx="930063" cy="830997"/>
           </a:xfrm>
           <a:prstGeom prst="rect">
@@ -4955,14 +5391,14 @@
         </p:nvGrpSpPr>
         <p:grpSpPr>
           <a:xfrm>
-            <a:off x="556747" y="1525454"/>
-            <a:ext cx="1680588" cy="1628574"/>
-            <a:chOff x="633302" y="1093158"/>
-            <a:chExt cx="1680588" cy="1628574"/>
+            <a:off x="594851" y="1511093"/>
+            <a:ext cx="1680588" cy="1647722"/>
+            <a:chOff x="633302" y="1078797"/>
+            <a:chExt cx="1680588" cy="1647722"/>
           </a:xfrm>
         </p:grpSpPr>
-        <mc:AlternateContent xmlns:mc="http://schemas.openxmlformats.org/markup-compatibility/2006">
-          <mc:Choice xmlns:a14="http://schemas.microsoft.com/office/drawing/2010/main" Requires="a14">
+        <mc:AlternateContent xmlns:mc="http://schemas.openxmlformats.org/markup-compatibility/2006" xmlns:a14="http://schemas.microsoft.com/office/drawing/2010/main">
+          <mc:Choice Requires="a14">
             <p:sp>
               <p:nvSpPr>
                 <p:cNvPr id="110" name="TextBox 109">
@@ -4977,7 +5413,7 @@
               </p:nvSpPr>
               <p:spPr>
                 <a:xfrm>
-                  <a:off x="1323554" y="1093158"/>
+                  <a:off x="1323554" y="1078797"/>
                   <a:ext cx="491353" cy="492443"/>
                 </a:xfrm>
                 <a:prstGeom prst="rect">
@@ -5031,7 +5467,7 @@
               </p:txBody>
             </p:sp>
           </mc:Choice>
-          <mc:Fallback>
+          <mc:Fallback xmlns="">
             <p:sp>
               <p:nvSpPr>
                 <p:cNvPr id="110" name="TextBox 109">
@@ -5048,16 +5484,16 @@
               </p:nvSpPr>
               <p:spPr>
                 <a:xfrm>
-                  <a:off x="1323554" y="1093158"/>
+                  <a:off x="1323554" y="1078797"/>
                   <a:ext cx="491353" cy="492443"/>
                 </a:xfrm>
                 <a:prstGeom prst="rect">
                   <a:avLst/>
                 </a:prstGeom>
                 <a:blipFill>
-                  <a:blip r:embed="rId10"/>
+                  <a:blip r:embed="rId11"/>
                   <a:stretch>
-                    <a:fillRect l="-17500" r="-5000" b="-15385"/>
+                    <a:fillRect l="-15000" r="-5000" b="-15000"/>
                   </a:stretch>
                 </a:blipFill>
               </p:spPr>
@@ -5092,9 +5528,9 @@
           </p:nvGrpSpPr>
           <p:grpSpPr>
             <a:xfrm>
-              <a:off x="633302" y="1811814"/>
+              <a:off x="633302" y="1816601"/>
               <a:ext cx="1680588" cy="909918"/>
-              <a:chOff x="1560917" y="1595834"/>
+              <a:chOff x="1560917" y="1601818"/>
               <a:chExt cx="2100734" cy="1137398"/>
             </a:xfrm>
           </p:grpSpPr>
@@ -5112,9 +5548,9 @@
             </p:nvGrpSpPr>
             <p:grpSpPr>
               <a:xfrm>
-                <a:off x="1560917" y="1595834"/>
+                <a:off x="1560917" y="1601818"/>
                 <a:ext cx="2100734" cy="1137398"/>
-                <a:chOff x="1408517" y="1443434"/>
+                <a:chOff x="1408517" y="1449418"/>
                 <a:chExt cx="2100734" cy="1137398"/>
               </a:xfrm>
             </p:grpSpPr>
@@ -5132,94 +5568,42 @@
               </p:nvGrpSpPr>
               <p:grpSpPr>
                 <a:xfrm>
-                  <a:off x="1408517" y="1443434"/>
+                  <a:off x="1408517" y="1449418"/>
                   <a:ext cx="2100734" cy="1137398"/>
-                  <a:chOff x="1256117" y="1291034"/>
+                  <a:chOff x="1256117" y="1297018"/>
                   <a:chExt cx="2100734" cy="1137398"/>
                 </a:xfrm>
               </p:grpSpPr>
-              <p:grpSp>
-                <p:nvGrpSpPr>
-                  <p:cNvPr id="128" name="Group 127">
+              <p:pic>
+                <p:nvPicPr>
+                  <p:cNvPr id="150" name="Picture 149">
                     <a:extLst>
                       <a:ext uri="{FF2B5EF4-FFF2-40B4-BE49-F238E27FC236}">
-                        <a16:creationId xmlns:a16="http://schemas.microsoft.com/office/drawing/2014/main" id="{986AD0F2-13BD-3140-A043-FD951040A1FC}"/>
+                        <a16:creationId xmlns:a16="http://schemas.microsoft.com/office/drawing/2014/main" id="{ABDCC6F7-07C8-514D-A03F-562BE4B40DFA}"/>
                       </a:ext>
                     </a:extLst>
                   </p:cNvPr>
-                  <p:cNvGrpSpPr>
-                    <a:grpSpLocks noChangeAspect="1"/>
-                  </p:cNvGrpSpPr>
+                  <p:cNvPicPr>
+                    <a:picLocks noChangeAspect="1"/>
+                  </p:cNvPicPr>
                   <p:nvPr/>
-                </p:nvGrpSpPr>
-                <p:grpSpPr>
+                </p:nvPicPr>
+                <p:blipFill>
+                  <a:blip r:embed="rId3"/>
+                  <a:stretch>
+                    <a:fillRect/>
+                  </a:stretch>
+                </p:blipFill>
+                <p:spPr>
                   <a:xfrm>
-                    <a:off x="1256117" y="1291034"/>
+                    <a:off x="1256117" y="1297018"/>
                     <a:ext cx="2100734" cy="1137398"/>
-                    <a:chOff x="-244865" y="-23234"/>
-                    <a:chExt cx="8890000" cy="4813300"/>
                   </a:xfrm>
-                </p:grpSpPr>
-                <p:pic>
-                  <p:nvPicPr>
-                    <p:cNvPr id="150" name="Picture 149">
-                      <a:extLst>
-                        <a:ext uri="{FF2B5EF4-FFF2-40B4-BE49-F238E27FC236}">
-                          <a16:creationId xmlns:a16="http://schemas.microsoft.com/office/drawing/2014/main" id="{ABDCC6F7-07C8-514D-A03F-562BE4B40DFA}"/>
-                        </a:ext>
-                      </a:extLst>
-                    </p:cNvPr>
-                    <p:cNvPicPr>
-                      <a:picLocks noChangeAspect="1"/>
-                    </p:cNvPicPr>
-                    <p:nvPr/>
-                  </p:nvPicPr>
-                  <p:blipFill>
-                    <a:blip r:embed="rId2"/>
-                    <a:stretch>
-                      <a:fillRect/>
-                    </a:stretch>
-                  </p:blipFill>
-                  <p:spPr>
-                    <a:xfrm>
-                      <a:off x="-244865" y="-23234"/>
-                      <a:ext cx="8890000" cy="4813300"/>
-                    </a:xfrm>
-                    <a:prstGeom prst="rect">
-                      <a:avLst/>
-                    </a:prstGeom>
-                  </p:spPr>
-                </p:pic>
-                <p:pic>
-                  <p:nvPicPr>
-                    <p:cNvPr id="151" name="Picture 150">
-                      <a:extLst>
-                        <a:ext uri="{FF2B5EF4-FFF2-40B4-BE49-F238E27FC236}">
-                          <a16:creationId xmlns:a16="http://schemas.microsoft.com/office/drawing/2014/main" id="{072820FB-C4F5-8249-B05E-56BF0EC2A4E1}"/>
-                        </a:ext>
-                      </a:extLst>
-                    </p:cNvPr>
-                    <p:cNvPicPr>
-                      <a:picLocks noChangeAspect="1"/>
-                    </p:cNvPicPr>
-                    <p:nvPr/>
-                  </p:nvPicPr>
-                  <p:blipFill rotWithShape="1">
-                    <a:blip r:embed="rId3"/>
-                    <a:srcRect l="28579" t="79553" r="57039"/>
-                    <a:stretch/>
-                  </p:blipFill>
-                  <p:spPr>
-                    <a:xfrm>
-                      <a:off x="3555508" y="1891193"/>
-                      <a:ext cx="1278542" cy="986778"/>
-                    </a:xfrm>
-                    <a:prstGeom prst="rect">
-                      <a:avLst/>
-                    </a:prstGeom>
-                  </p:spPr>
-                </p:pic>
-              </p:grpSp>
+                  <a:prstGeom prst="rect">
+                    <a:avLst/>
+                  </a:prstGeom>
+                </p:spPr>
+              </p:pic>
               <p:pic>
                 <p:nvPicPr>
                   <p:cNvPr id="149" name="Picture 148">
@@ -5235,14 +5619,14 @@
                   <p:nvPr/>
                 </p:nvPicPr>
                 <p:blipFill rotWithShape="1">
-                  <a:blip r:embed="rId2"/>
-                  <a:srcRect l="57199" t="40263" r="28896" b="40475"/>
+                  <a:blip r:embed="rId3"/>
+                  <a:srcRect l="57199" t="39963" r="28896" b="40755"/>
                   <a:stretch/>
                 </p:blipFill>
                 <p:spPr>
                   <a:xfrm>
-                    <a:off x="2155867" y="1750195"/>
-                    <a:ext cx="292101" cy="219075"/>
+                    <a:off x="2160089" y="1756038"/>
+                    <a:ext cx="292101" cy="219306"/>
                   </a:xfrm>
                   <a:prstGeom prst="rect">
                     <a:avLst/>
@@ -5265,13 +5649,13 @@
                 <p:nvPr/>
               </p:nvPicPr>
               <p:blipFill rotWithShape="1">
-                <a:blip r:embed="rId2"/>
+                <a:blip r:embed="rId3"/>
                 <a:srcRect l="57199" t="40263" r="28896" b="40475"/>
                 <a:stretch/>
               </p:blipFill>
               <p:spPr>
                 <a:xfrm>
-                  <a:off x="2011779" y="1902595"/>
+                  <a:off x="2011779" y="1908578"/>
                   <a:ext cx="292101" cy="219075"/>
                 </a:xfrm>
                 <a:prstGeom prst="rect">
@@ -5295,13 +5679,13 @@
               <p:nvPr/>
             </p:nvPicPr>
             <p:blipFill rotWithShape="1">
-              <a:blip r:embed="rId2"/>
+              <a:blip r:embed="rId3"/>
               <a:srcRect l="57199" t="40263" r="28896" b="40475"/>
               <a:stretch/>
             </p:blipFill>
             <p:spPr>
               <a:xfrm>
-                <a:off x="1865729" y="2054273"/>
+                <a:off x="1865729" y="2060257"/>
                 <a:ext cx="292101" cy="219075"/>
               </a:xfrm>
               <a:prstGeom prst="rect">
@@ -5325,10 +5709,10 @@
         </p:nvGrpSpPr>
         <p:grpSpPr>
           <a:xfrm>
-            <a:off x="5273068" y="1534405"/>
-            <a:ext cx="1680587" cy="1628637"/>
-            <a:chOff x="7657622" y="4134648"/>
-            <a:chExt cx="1680587" cy="1628637"/>
+            <a:off x="5330320" y="1510470"/>
+            <a:ext cx="1680587" cy="1652572"/>
+            <a:chOff x="7657622" y="4110713"/>
+            <a:chExt cx="1680587" cy="1652572"/>
           </a:xfrm>
         </p:grpSpPr>
         <mc:AlternateContent xmlns:mc="http://schemas.openxmlformats.org/markup-compatibility/2006" xmlns:a14="http://schemas.microsoft.com/office/drawing/2010/main">
@@ -5347,7 +5731,7 @@
               </p:nvSpPr>
               <p:spPr>
                 <a:xfrm>
-                  <a:off x="8300125" y="4134648"/>
+                  <a:off x="8300125" y="4110713"/>
                   <a:ext cx="481863" cy="492443"/>
                 </a:xfrm>
                 <a:prstGeom prst="rect">
@@ -5418,16 +5802,16 @@
               </p:nvSpPr>
               <p:spPr>
                 <a:xfrm>
-                  <a:off x="8300125" y="4134648"/>
+                  <a:off x="8300125" y="4110713"/>
                   <a:ext cx="481863" cy="492443"/>
                 </a:xfrm>
                 <a:prstGeom prst="rect">
                   <a:avLst/>
                 </a:prstGeom>
                 <a:blipFill>
-                  <a:blip r:embed="rId11"/>
+                  <a:blip r:embed="rId12"/>
                   <a:stretch>
-                    <a:fillRect l="-17949" r="-2564" b="-10000"/>
+                    <a:fillRect l="-18421" r="-5263" b="-10000"/>
                   </a:stretch>
                 </a:blipFill>
               </p:spPr>
@@ -5483,7 +5867,7 @@
               <p:nvPr/>
             </p:nvPicPr>
             <p:blipFill>
-              <a:blip r:embed="rId2"/>
+              <a:blip r:embed="rId3"/>
               <a:stretch>
                 <a:fillRect/>
               </a:stretch>
@@ -5513,14 +5897,14 @@
               <p:nvPr/>
             </p:nvPicPr>
             <p:blipFill rotWithShape="1">
-              <a:blip r:embed="rId2"/>
-              <a:srcRect l="57199" t="40263" r="28896" b="40475"/>
+              <a:blip r:embed="rId3"/>
+              <a:srcRect l="56876" t="40263" r="28897" b="40475"/>
               <a:stretch/>
             </p:blipFill>
             <p:spPr>
               <a:xfrm>
-                <a:off x="1269877" y="4707674"/>
-                <a:ext cx="292101" cy="219075"/>
+                <a:off x="1263124" y="4707674"/>
+                <a:ext cx="298855" cy="219075"/>
               </a:xfrm>
               <a:prstGeom prst="rect">
                 <a:avLst/>
@@ -5542,7 +5926,7 @@
               <p:nvPr/>
             </p:nvPicPr>
             <p:blipFill rotWithShape="1">
-              <a:blip r:embed="rId2"/>
+              <a:blip r:embed="rId3"/>
               <a:srcRect l="57199" t="40263" r="28896" b="40475"/>
               <a:stretch/>
             </p:blipFill>
@@ -5574,7 +5958,7 @@
         </p:nvCxnSpPr>
         <p:spPr>
           <a:xfrm flipV="1">
-            <a:off x="3442790" y="1567337"/>
+            <a:off x="3476107" y="1567337"/>
             <a:ext cx="569471" cy="1827757"/>
           </a:xfrm>
           <a:prstGeom prst="straightConnector1">
@@ -5616,7 +6000,7 @@
         </p:nvSpPr>
         <p:spPr>
           <a:xfrm>
-            <a:off x="7381633" y="3396284"/>
+            <a:off x="7434098" y="3396284"/>
             <a:ext cx="1828800" cy="1828800"/>
           </a:xfrm>
           <a:prstGeom prst="rect">
@@ -5679,7 +6063,7 @@
         </p:nvCxnSpPr>
         <p:spPr>
           <a:xfrm>
-            <a:off x="6726258" y="3433349"/>
+            <a:off x="6778723" y="3423775"/>
             <a:ext cx="628316" cy="630936"/>
           </a:xfrm>
           <a:prstGeom prst="straightConnector1">
@@ -5723,7 +6107,7 @@
         </p:nvCxnSpPr>
         <p:spPr>
           <a:xfrm flipV="1">
-            <a:off x="8126845" y="1580720"/>
+            <a:off x="8174523" y="1580720"/>
             <a:ext cx="569471" cy="1827757"/>
           </a:xfrm>
           <a:prstGeom prst="straightConnector1">
@@ -5767,7 +6151,7 @@
         </p:nvGrpSpPr>
         <p:grpSpPr>
           <a:xfrm>
-            <a:off x="7454812" y="3818831"/>
+            <a:off x="7507277" y="3818831"/>
             <a:ext cx="1680587" cy="909918"/>
             <a:chOff x="365555" y="4248513"/>
             <a:chExt cx="2100734" cy="1137398"/>
@@ -5788,7 +6172,7 @@
             <p:nvPr/>
           </p:nvPicPr>
           <p:blipFill>
-            <a:blip r:embed="rId2"/>
+            <a:blip r:embed="rId3"/>
             <a:stretch>
               <a:fillRect/>
             </a:stretch>
@@ -5818,7 +6202,7 @@
             <p:nvPr/>
           </p:nvPicPr>
           <p:blipFill rotWithShape="1">
-            <a:blip r:embed="rId2"/>
+            <a:blip r:embed="rId3"/>
             <a:srcRect l="57199" t="40263" r="28896" b="40475"/>
             <a:stretch/>
           </p:blipFill>
@@ -5847,7 +6231,7 @@
             <p:nvPr/>
           </p:nvPicPr>
           <p:blipFill rotWithShape="1">
-            <a:blip r:embed="rId2"/>
+            <a:blip r:embed="rId3"/>
             <a:srcRect l="57199" t="40263" r="28896" b="40475"/>
             <a:stretch/>
           </p:blipFill>
@@ -5877,14 +6261,14 @@
           <p:nvPr/>
         </p:nvPicPr>
         <p:blipFill>
-          <a:blip r:embed="rId4"/>
+          <a:blip r:embed="rId5"/>
           <a:stretch>
             <a:fillRect/>
           </a:stretch>
         </p:blipFill>
         <p:spPr>
           <a:xfrm>
-            <a:off x="8051749" y="4272053"/>
+            <a:off x="8104214" y="4272053"/>
             <a:ext cx="143256" cy="297180"/>
           </a:xfrm>
           <a:prstGeom prst="rect">
@@ -5892,8 +6276,8 @@
           </a:prstGeom>
         </p:spPr>
       </p:pic>
-      <mc:AlternateContent xmlns:mc="http://schemas.openxmlformats.org/markup-compatibility/2006" xmlns:a14="http://schemas.microsoft.com/office/drawing/2010/main">
-        <mc:Choice Requires="a14">
+      <mc:AlternateContent xmlns:mc="http://schemas.openxmlformats.org/markup-compatibility/2006">
+        <mc:Choice xmlns:a14="http://schemas.microsoft.com/office/drawing/2010/main" Requires="a14">
           <p:sp>
             <p:nvSpPr>
               <p:cNvPr id="148" name="TextBox 147">
@@ -5908,7 +6292,7 @@
             </p:nvSpPr>
             <p:spPr>
               <a:xfrm>
-                <a:off x="8159419" y="4347722"/>
+                <a:off x="8211884" y="4347722"/>
                 <a:ext cx="452816" cy="492443"/>
               </a:xfrm>
               <a:prstGeom prst="rect">
@@ -5962,7 +6346,7 @@
             </p:txBody>
           </p:sp>
         </mc:Choice>
-        <mc:Fallback xmlns="">
+        <mc:Fallback>
           <p:sp>
             <p:nvSpPr>
               <p:cNvPr id="148" name="TextBox 147">
@@ -5979,16 +6363,16 @@
             </p:nvSpPr>
             <p:spPr>
               <a:xfrm>
-                <a:off x="8159419" y="4347722"/>
+                <a:off x="8211884" y="4347722"/>
                 <a:ext cx="452816" cy="492443"/>
               </a:xfrm>
               <a:prstGeom prst="rect">
                 <a:avLst/>
               </a:prstGeom>
               <a:blipFill>
-                <a:blip r:embed="rId12"/>
+                <a:blip r:embed="rId13"/>
                 <a:stretch>
-                  <a:fillRect l="-8108" r="-5405" b="-10000"/>
+                  <a:fillRect l="-11111" r="-5556" b="-10000"/>
                 </a:stretch>
               </a:blipFill>
             </p:spPr>
@@ -6021,7 +6405,7 @@
         </p:nvGrpSpPr>
         <p:grpSpPr>
           <a:xfrm>
-            <a:off x="8336266" y="435773"/>
+            <a:off x="8388731" y="435773"/>
             <a:ext cx="1098850" cy="1069848"/>
             <a:chOff x="9925705" y="2389328"/>
             <a:chExt cx="1098850" cy="1069848"/>
@@ -6182,7 +6566,7 @@
                   <a:avLst/>
                 </a:prstGeom>
                 <a:blipFill>
-                  <a:blip r:embed="rId13"/>
+                  <a:blip r:embed="rId14"/>
                   <a:stretch>
                     <a:fillRect l="-3659" r="-1220" b="-15385"/>
                   </a:stretch>
@@ -6220,7 +6604,7 @@
         </p:nvCxnSpPr>
         <p:spPr>
           <a:xfrm>
-            <a:off x="7146623" y="2538838"/>
+            <a:off x="7203875" y="2538838"/>
             <a:ext cx="2609619" cy="0"/>
           </a:xfrm>
           <a:prstGeom prst="straightConnector1">
@@ -6264,7 +6648,7 @@
             </p:nvSpPr>
             <p:spPr>
               <a:xfrm>
-                <a:off x="11861237" y="1537687"/>
+                <a:off x="11899341" y="1508965"/>
                 <a:ext cx="491353" cy="492443"/>
               </a:xfrm>
               <a:prstGeom prst="rect">
@@ -6335,14 +6719,14 @@
             </p:nvSpPr>
             <p:spPr>
               <a:xfrm>
-                <a:off x="11861237" y="1537687"/>
+                <a:off x="11899341" y="1508965"/>
                 <a:ext cx="491353" cy="492443"/>
               </a:xfrm>
               <a:prstGeom prst="rect">
                 <a:avLst/>
               </a:prstGeom>
               <a:blipFill>
-                <a:blip r:embed="rId14"/>
+                <a:blip r:embed="rId15"/>
                 <a:stretch>
                   <a:fillRect l="-17500" r="-2500" b="-10000"/>
                 </a:stretch>
@@ -6377,7 +6761,7 @@
         </p:nvGrpSpPr>
         <p:grpSpPr>
           <a:xfrm>
-            <a:off x="11241722" y="2270631"/>
+            <a:off x="11279826" y="2251483"/>
             <a:ext cx="1675354" cy="907085"/>
             <a:chOff x="1197234" y="14329953"/>
             <a:chExt cx="1675354" cy="907085"/>
@@ -6407,6 +6791,35 @@
           </p:grpSpPr>
           <p:pic>
             <p:nvPicPr>
+              <p:cNvPr id="175" name="Picture 174">
+                <a:extLst>
+                  <a:ext uri="{FF2B5EF4-FFF2-40B4-BE49-F238E27FC236}">
+                    <a16:creationId xmlns:a16="http://schemas.microsoft.com/office/drawing/2014/main" id="{D81CA682-19C0-EF47-871D-78BDAB7BC210}"/>
+                  </a:ext>
+                </a:extLst>
+              </p:cNvPr>
+              <p:cNvPicPr>
+                <a:picLocks noChangeAspect="1"/>
+              </p:cNvPicPr>
+              <p:nvPr/>
+            </p:nvPicPr>
+            <p:blipFill rotWithShape="1">
+              <a:blip r:embed="rId4"/>
+              <a:srcRect l="28579" t="79553" r="57039"/>
+              <a:stretch/>
+            </p:blipFill>
+            <p:spPr>
+              <a:xfrm>
+                <a:off x="7992908" y="5864581"/>
+                <a:ext cx="302122" cy="233179"/>
+              </a:xfrm>
+              <a:prstGeom prst="rect">
+                <a:avLst/>
+              </a:prstGeom>
+            </p:spPr>
+          </p:pic>
+          <p:pic>
+            <p:nvPicPr>
               <p:cNvPr id="174" name="Picture 173">
                 <a:extLst>
                   <a:ext uri="{FF2B5EF4-FFF2-40B4-BE49-F238E27FC236}">
@@ -6420,7 +6833,7 @@
               <p:nvPr/>
             </p:nvPicPr>
             <p:blipFill>
-              <a:blip r:embed="rId2"/>
+              <a:blip r:embed="rId3"/>
               <a:stretch>
                 <a:fillRect/>
               </a:stretch>
@@ -6429,35 +6842,6 @@
               <a:xfrm>
                 <a:off x="7098837" y="5416165"/>
                 <a:ext cx="2094192" cy="1133856"/>
-              </a:xfrm>
-              <a:prstGeom prst="rect">
-                <a:avLst/>
-              </a:prstGeom>
-            </p:spPr>
-          </p:pic>
-          <p:pic>
-            <p:nvPicPr>
-              <p:cNvPr id="175" name="Picture 174">
-                <a:extLst>
-                  <a:ext uri="{FF2B5EF4-FFF2-40B4-BE49-F238E27FC236}">
-                    <a16:creationId xmlns:a16="http://schemas.microsoft.com/office/drawing/2014/main" id="{D81CA682-19C0-EF47-871D-78BDAB7BC210}"/>
-                  </a:ext>
-                </a:extLst>
-              </p:cNvPr>
-              <p:cNvPicPr>
-                <a:picLocks noChangeAspect="1"/>
-              </p:cNvPicPr>
-              <p:nvPr/>
-            </p:nvPicPr>
-            <p:blipFill rotWithShape="1">
-              <a:blip r:embed="rId3"/>
-              <a:srcRect l="28579" t="79553" r="57039"/>
-              <a:stretch/>
-            </p:blipFill>
-            <p:spPr>
-              <a:xfrm>
-                <a:off x="7992908" y="5864581"/>
-                <a:ext cx="302122" cy="233179"/>
               </a:xfrm>
               <a:prstGeom prst="rect">
                 <a:avLst/>
@@ -6480,7 +6864,7 @@
             <p:nvPr/>
           </p:nvPicPr>
           <p:blipFill rotWithShape="1">
-            <a:blip r:embed="rId3"/>
+            <a:blip r:embed="rId4"/>
             <a:srcRect l="57222" t="20338" r="28746" b="60144"/>
             <a:stretch/>
           </p:blipFill>
@@ -6511,7 +6895,7 @@
         </p:nvCxnSpPr>
         <p:spPr>
           <a:xfrm>
-            <a:off x="13135660" y="2545283"/>
+            <a:off x="13135156" y="2545283"/>
             <a:ext cx="2609619" cy="0"/>
           </a:xfrm>
           <a:prstGeom prst="straightConnector1">
@@ -6555,7 +6939,7 @@
         </p:nvCxnSpPr>
         <p:spPr>
           <a:xfrm flipV="1">
-            <a:off x="4514645" y="3313913"/>
+            <a:off x="4562323" y="3313913"/>
             <a:ext cx="816724" cy="720282"/>
           </a:xfrm>
           <a:prstGeom prst="straightConnector1">
@@ -6599,7 +6983,7 @@
         </p:nvCxnSpPr>
         <p:spPr>
           <a:xfrm flipV="1">
-            <a:off x="9220384" y="3313913"/>
+            <a:off x="9268062" y="3313913"/>
             <a:ext cx="816724" cy="720282"/>
           </a:xfrm>
           <a:prstGeom prst="straightConnector1">
@@ -6643,7 +7027,7 @@
         </p:nvCxnSpPr>
         <p:spPr>
           <a:xfrm flipV="1">
-            <a:off x="15248215" y="3313913"/>
+            <a:off x="15224414" y="3313913"/>
             <a:ext cx="816724" cy="720282"/>
           </a:xfrm>
           <a:prstGeom prst="straightConnector1">
@@ -6685,7 +7069,7 @@
         </p:nvSpPr>
         <p:spPr>
           <a:xfrm>
-            <a:off x="4408888" y="80957"/>
+            <a:off x="4446992" y="80957"/>
             <a:ext cx="2751472" cy="461665"/>
           </a:xfrm>
           <a:prstGeom prst="rect">
@@ -6720,7 +7104,7 @@
         </p:nvSpPr>
         <p:spPr>
           <a:xfrm>
-            <a:off x="4771068" y="437261"/>
+            <a:off x="4809172" y="437261"/>
             <a:ext cx="2808722" cy="461665"/>
           </a:xfrm>
           <a:prstGeom prst="rect">
@@ -6755,7 +7139,7 @@
         </p:nvSpPr>
         <p:spPr>
           <a:xfrm>
-            <a:off x="-157206" y="723916"/>
+            <a:off x="-119102" y="723916"/>
             <a:ext cx="3348723" cy="830997"/>
           </a:xfrm>
           <a:prstGeom prst="rect">
@@ -6791,7 +7175,7 @@
         </p:nvSpPr>
         <p:spPr>
           <a:xfrm>
-            <a:off x="79035" y="4515326"/>
+            <a:off x="112196" y="4515326"/>
             <a:ext cx="2600785" cy="830997"/>
           </a:xfrm>
           <a:prstGeom prst="rect">
@@ -6834,7 +7218,7 @@
         </p:nvSpPr>
         <p:spPr>
           <a:xfrm>
-            <a:off x="15245206" y="4515326"/>
+            <a:off x="15235440" y="4515326"/>
             <a:ext cx="3510109" cy="830997"/>
           </a:xfrm>
           <a:prstGeom prst="rect">
@@ -6869,7 +7253,7 @@
         </p:nvSpPr>
         <p:spPr>
           <a:xfrm>
-            <a:off x="11528189" y="76791"/>
+            <a:off x="11532532" y="95843"/>
             <a:ext cx="3155280" cy="461665"/>
           </a:xfrm>
           <a:prstGeom prst="rect">
@@ -6905,7 +7289,7 @@
         </p:nvSpPr>
         <p:spPr>
           <a:xfrm>
-            <a:off x="12120449" y="437199"/>
+            <a:off x="12124792" y="456251"/>
             <a:ext cx="2166193" cy="461665"/>
           </a:xfrm>
           <a:prstGeom prst="rect">
@@ -6941,7 +7325,7 @@
         </p:nvSpPr>
         <p:spPr>
           <a:xfrm>
-            <a:off x="15639530" y="719551"/>
+            <a:off x="15667904" y="719551"/>
             <a:ext cx="2600785" cy="830997"/>
           </a:xfrm>
           <a:prstGeom prst="rect">
@@ -6984,7 +7368,7 @@
         </p:nvGrpSpPr>
         <p:grpSpPr>
           <a:xfrm>
-            <a:off x="793323" y="2009760"/>
+            <a:off x="831427" y="2009760"/>
             <a:ext cx="1443760" cy="241096"/>
             <a:chOff x="793323" y="1985376"/>
             <a:chExt cx="1443760" cy="241096"/>
@@ -7005,7 +7389,7 @@
             <p:nvPr/>
           </p:nvPicPr>
           <p:blipFill>
-            <a:blip r:embed="rId15"/>
+            <a:blip r:embed="rId16"/>
             <a:stretch>
               <a:fillRect/>
             </a:stretch>
@@ -7035,7 +7419,7 @@
             <p:nvPr/>
           </p:nvPicPr>
           <p:blipFill>
-            <a:blip r:embed="rId15"/>
+            <a:blip r:embed="rId16"/>
             <a:stretch>
               <a:fillRect/>
             </a:stretch>
@@ -7065,7 +7449,7 @@
             <p:nvPr/>
           </p:nvPicPr>
           <p:blipFill>
-            <a:blip r:embed="rId15"/>
+            <a:blip r:embed="rId16"/>
             <a:stretch>
               <a:fillRect/>
             </a:stretch>
@@ -7095,7 +7479,7 @@
             <p:nvPr/>
           </p:nvPicPr>
           <p:blipFill>
-            <a:blip r:embed="rId15"/>
+            <a:blip r:embed="rId16"/>
             <a:stretch>
               <a:fillRect/>
             </a:stretch>
@@ -7125,7 +7509,7 @@
             <p:nvPr/>
           </p:nvPicPr>
           <p:blipFill>
-            <a:blip r:embed="rId15"/>
+            <a:blip r:embed="rId16"/>
             <a:stretch>
               <a:fillRect/>
             </a:stretch>
@@ -7155,7 +7539,7 @@
             <p:nvPr/>
           </p:nvPicPr>
           <p:blipFill>
-            <a:blip r:embed="rId15"/>
+            <a:blip r:embed="rId16"/>
             <a:stretch>
               <a:fillRect/>
             </a:stretch>
@@ -7185,7 +7569,7 @@
         </p:nvGrpSpPr>
         <p:grpSpPr>
           <a:xfrm>
-            <a:off x="5507985" y="2015185"/>
+            <a:off x="5565237" y="2015185"/>
             <a:ext cx="1444102" cy="241114"/>
             <a:chOff x="5507985" y="2015185"/>
             <a:chExt cx="1444102" cy="241114"/>
@@ -7226,7 +7610,7 @@
               <p:nvPr/>
             </p:nvPicPr>
             <p:blipFill>
-              <a:blip r:embed="rId15"/>
+              <a:blip r:embed="rId16"/>
               <a:stretch>
                 <a:fillRect/>
               </a:stretch>
@@ -7256,7 +7640,7 @@
               <p:nvPr/>
             </p:nvPicPr>
             <p:blipFill>
-              <a:blip r:embed="rId15"/>
+              <a:blip r:embed="rId16"/>
               <a:stretch>
                 <a:fillRect/>
               </a:stretch>
@@ -7286,7 +7670,7 @@
               <p:nvPr/>
             </p:nvPicPr>
             <p:blipFill>
-              <a:blip r:embed="rId15"/>
+              <a:blip r:embed="rId16"/>
               <a:stretch>
                 <a:fillRect/>
               </a:stretch>
@@ -7316,7 +7700,7 @@
               <p:nvPr/>
             </p:nvPicPr>
             <p:blipFill>
-              <a:blip r:embed="rId15"/>
+              <a:blip r:embed="rId16"/>
               <a:stretch>
                 <a:fillRect/>
               </a:stretch>
@@ -7346,7 +7730,7 @@
               <p:nvPr/>
             </p:nvPicPr>
             <p:blipFill>
-              <a:blip r:embed="rId15"/>
+              <a:blip r:embed="rId16"/>
               <a:stretch>
                 <a:fillRect/>
               </a:stretch>
@@ -7377,7 +7761,7 @@
             <p:nvPr/>
           </p:nvPicPr>
           <p:blipFill>
-            <a:blip r:embed="rId16"/>
+            <a:blip r:embed="rId17"/>
             <a:stretch>
               <a:fillRect/>
             </a:stretch>
@@ -7407,10 +7791,10 @@
         </p:nvGrpSpPr>
         <p:grpSpPr>
           <a:xfrm>
-            <a:off x="11475014" y="2032326"/>
-            <a:ext cx="1444102" cy="241128"/>
-            <a:chOff x="11447455" y="2056710"/>
-            <a:chExt cx="1444102" cy="241128"/>
+            <a:off x="11517905" y="2013178"/>
+            <a:ext cx="1434528" cy="241128"/>
+            <a:chOff x="11452242" y="2056710"/>
+            <a:chExt cx="1434528" cy="241128"/>
           </a:xfrm>
         </p:grpSpPr>
         <p:grpSp>
@@ -7427,10 +7811,10 @@
           </p:nvGrpSpPr>
           <p:grpSpPr>
             <a:xfrm>
-              <a:off x="11447455" y="2056710"/>
-              <a:ext cx="1444102" cy="241114"/>
-              <a:chOff x="5507985" y="2011872"/>
-              <a:chExt cx="1444102" cy="241114"/>
+              <a:off x="11452242" y="2056710"/>
+              <a:ext cx="1434528" cy="241114"/>
+              <a:chOff x="5512772" y="2011872"/>
+              <a:chExt cx="1434528" cy="241114"/>
             </a:xfrm>
           </p:grpSpPr>
           <p:grpSp>
@@ -7447,9 +7831,9 @@
             </p:nvGrpSpPr>
             <p:grpSpPr>
               <a:xfrm>
-                <a:off x="6226622" y="2011872"/>
+                <a:off x="6221835" y="2011872"/>
                 <a:ext cx="725465" cy="240976"/>
-                <a:chOff x="1511618" y="1982063"/>
+                <a:chOff x="1506831" y="1982063"/>
                 <a:chExt cx="725465" cy="240976"/>
               </a:xfrm>
             </p:grpSpPr>
@@ -7468,14 +7852,14 @@
                 <p:nvPr/>
               </p:nvPicPr>
               <p:blipFill>
-                <a:blip r:embed="rId15"/>
+                <a:blip r:embed="rId16"/>
                 <a:stretch>
                   <a:fillRect/>
                 </a:stretch>
               </p:blipFill>
               <p:spPr>
                 <a:xfrm>
-                  <a:off x="1511618" y="1982063"/>
+                  <a:off x="1506831" y="1982063"/>
                   <a:ext cx="246888" cy="240975"/>
                 </a:xfrm>
                 <a:prstGeom prst="rect">
@@ -7498,14 +7882,14 @@
                 <p:nvPr/>
               </p:nvPicPr>
               <p:blipFill>
-                <a:blip r:embed="rId15"/>
+                <a:blip r:embed="rId16"/>
                 <a:stretch>
                   <a:fillRect/>
                 </a:stretch>
               </p:blipFill>
               <p:spPr>
                 <a:xfrm>
-                  <a:off x="1748759" y="1982064"/>
+                  <a:off x="1743972" y="1982064"/>
                   <a:ext cx="246888" cy="240975"/>
                 </a:xfrm>
                 <a:prstGeom prst="rect">
@@ -7528,14 +7912,14 @@
                 <p:nvPr/>
               </p:nvPicPr>
               <p:blipFill>
-                <a:blip r:embed="rId15"/>
+                <a:blip r:embed="rId16"/>
                 <a:stretch>
                   <a:fillRect/>
                 </a:stretch>
               </p:blipFill>
               <p:spPr>
                 <a:xfrm>
-                  <a:off x="1990195" y="1982063"/>
+                  <a:off x="1985408" y="1982063"/>
                   <a:ext cx="246888" cy="240975"/>
                 </a:xfrm>
                 <a:prstGeom prst="rect">
@@ -7559,14 +7943,14 @@
               <p:nvPr/>
             </p:nvPicPr>
             <p:blipFill>
-              <a:blip r:embed="rId16"/>
+              <a:blip r:embed="rId17"/>
               <a:stretch>
                 <a:fillRect/>
               </a:stretch>
             </p:blipFill>
             <p:spPr>
               <a:xfrm>
-                <a:off x="5507985" y="2012011"/>
+                <a:off x="5512772" y="2012011"/>
                 <a:ext cx="246888" cy="240975"/>
               </a:xfrm>
               <a:prstGeom prst="rect">
@@ -7590,14 +7974,14 @@
             <p:nvPr/>
           </p:nvPicPr>
           <p:blipFill>
-            <a:blip r:embed="rId17"/>
+            <a:blip r:embed="rId18"/>
             <a:stretch>
               <a:fillRect/>
             </a:stretch>
           </p:blipFill>
           <p:spPr>
             <a:xfrm>
-              <a:off x="11694715" y="2060024"/>
+              <a:off x="11689928" y="2060024"/>
               <a:ext cx="246888" cy="237744"/>
             </a:xfrm>
             <a:prstGeom prst="rect">
@@ -7620,14 +8004,14 @@
             <p:nvPr/>
           </p:nvPicPr>
           <p:blipFill>
-            <a:blip r:embed="rId18"/>
+            <a:blip r:embed="rId19"/>
             <a:stretch>
               <a:fillRect/>
             </a:stretch>
           </p:blipFill>
           <p:spPr>
             <a:xfrm>
-              <a:off x="11933755" y="2056863"/>
+              <a:off x="11928968" y="2056863"/>
               <a:ext cx="246888" cy="240975"/>
             </a:xfrm>
             <a:prstGeom prst="rect">
@@ -7650,7 +8034,7 @@
         </p:nvSpPr>
         <p:spPr>
           <a:xfrm flipV="1">
-            <a:off x="11683896" y="2033282"/>
+            <a:off x="11722000" y="2014134"/>
             <a:ext cx="361122" cy="9144"/>
           </a:xfrm>
           <a:prstGeom prst="rect">
@@ -7960,4 +8344,299 @@
     </a:ext>
   </a:extLst>
 </a:theme>
+</file>
+
+<file path=ppt/theme/theme2.xml><?xml version="1.0" encoding="utf-8"?>
+<a:theme xmlns:a="http://schemas.openxmlformats.org/drawingml/2006/main" name="Office Theme">
+  <a:themeElements>
+    <a:clrScheme name="Office">
+      <a:dk1>
+        <a:sysClr val="windowText" lastClr="000000"/>
+      </a:dk1>
+      <a:lt1>
+        <a:sysClr val="window" lastClr="FFFFFF"/>
+      </a:lt1>
+      <a:dk2>
+        <a:srgbClr val="44546A"/>
+      </a:dk2>
+      <a:lt2>
+        <a:srgbClr val="E7E6E6"/>
+      </a:lt2>
+      <a:accent1>
+        <a:srgbClr val="4472C4"/>
+      </a:accent1>
+      <a:accent2>
+        <a:srgbClr val="ED7D31"/>
+      </a:accent2>
+      <a:accent3>
+        <a:srgbClr val="A5A5A5"/>
+      </a:accent3>
+      <a:accent4>
+        <a:srgbClr val="FFC000"/>
+      </a:accent4>
+      <a:accent5>
+        <a:srgbClr val="5B9BD5"/>
+      </a:accent5>
+      <a:accent6>
+        <a:srgbClr val="70AD47"/>
+      </a:accent6>
+      <a:hlink>
+        <a:srgbClr val="0563C1"/>
+      </a:hlink>
+      <a:folHlink>
+        <a:srgbClr val="954F72"/>
+      </a:folHlink>
+    </a:clrScheme>
+    <a:fontScheme name="Office">
+      <a:majorFont>
+        <a:latin typeface="Calibri Light" panose="020F0302020204030204"/>
+        <a:ea typeface=""/>
+        <a:cs typeface=""/>
+        <a:font script="Jpan" typeface="游ゴシック Light"/>
+        <a:font script="Hang" typeface="맑은 고딕"/>
+        <a:font script="Hans" typeface="等线 Light"/>
+        <a:font script="Hant" typeface="新細明體"/>
+        <a:font script="Arab" typeface="Times New Roman"/>
+        <a:font script="Hebr" typeface="Times New Roman"/>
+        <a:font script="Thai" typeface="Angsana New"/>
+        <a:font script="Ethi" typeface="Nyala"/>
+        <a:font script="Beng" typeface="Vrinda"/>
+        <a:font script="Gujr" typeface="Shruti"/>
+        <a:font script="Khmr" typeface="MoolBoran"/>
+        <a:font script="Knda" typeface="Tunga"/>
+        <a:font script="Guru" typeface="Raavi"/>
+        <a:font script="Cans" typeface="Euphemia"/>
+        <a:font script="Cher" typeface="Plantagenet Cherokee"/>
+        <a:font script="Yiii" typeface="Microsoft Yi Baiti"/>
+        <a:font script="Tibt" typeface="Microsoft Himalaya"/>
+        <a:font script="Thaa" typeface="MV Boli"/>
+        <a:font script="Deva" typeface="Mangal"/>
+        <a:font script="Telu" typeface="Gautami"/>
+        <a:font script="Taml" typeface="Latha"/>
+        <a:font script="Syrc" typeface="Estrangelo Edessa"/>
+        <a:font script="Orya" typeface="Kalinga"/>
+        <a:font script="Mlym" typeface="Kartika"/>
+        <a:font script="Laoo" typeface="DokChampa"/>
+        <a:font script="Sinh" typeface="Iskoola Pota"/>
+        <a:font script="Mong" typeface="Mongolian Baiti"/>
+        <a:font script="Viet" typeface="Times New Roman"/>
+        <a:font script="Uigh" typeface="Microsoft Uighur"/>
+        <a:font script="Geor" typeface="Sylfaen"/>
+        <a:font script="Armn" typeface="Arial"/>
+        <a:font script="Bugi" typeface="Leelawadee UI"/>
+        <a:font script="Bopo" typeface="Microsoft JhengHei"/>
+        <a:font script="Java" typeface="Javanese Text"/>
+        <a:font script="Lisu" typeface="Segoe UI"/>
+        <a:font script="Mymr" typeface="Myanmar Text"/>
+        <a:font script="Nkoo" typeface="Ebrima"/>
+        <a:font script="Olck" typeface="Nirmala UI"/>
+        <a:font script="Osma" typeface="Ebrima"/>
+        <a:font script="Phag" typeface="Phagspa"/>
+        <a:font script="Syrn" typeface="Estrangelo Edessa"/>
+        <a:font script="Syrj" typeface="Estrangelo Edessa"/>
+        <a:font script="Syre" typeface="Estrangelo Edessa"/>
+        <a:font script="Sora" typeface="Nirmala UI"/>
+        <a:font script="Tale" typeface="Microsoft Tai Le"/>
+        <a:font script="Talu" typeface="Microsoft New Tai Lue"/>
+        <a:font script="Tfng" typeface="Ebrima"/>
+      </a:majorFont>
+      <a:minorFont>
+        <a:latin typeface="Calibri" panose="020F0502020204030204"/>
+        <a:ea typeface=""/>
+        <a:cs typeface=""/>
+        <a:font script="Jpan" typeface="游ゴシック"/>
+        <a:font script="Hang" typeface="맑은 고딕"/>
+        <a:font script="Hans" typeface="等线"/>
+        <a:font script="Hant" typeface="新細明體"/>
+        <a:font script="Arab" typeface="Arial"/>
+        <a:font script="Hebr" typeface="Arial"/>
+        <a:font script="Thai" typeface="Cordia New"/>
+        <a:font script="Ethi" typeface="Nyala"/>
+        <a:font script="Beng" typeface="Vrinda"/>
+        <a:font script="Gujr" typeface="Shruti"/>
+        <a:font script="Khmr" typeface="DaunPenh"/>
+        <a:font script="Knda" typeface="Tunga"/>
+        <a:font script="Guru" typeface="Raavi"/>
+        <a:font script="Cans" typeface="Euphemia"/>
+        <a:font script="Cher" typeface="Plantagenet Cherokee"/>
+        <a:font script="Yiii" typeface="Microsoft Yi Baiti"/>
+        <a:font script="Tibt" typeface="Microsoft Himalaya"/>
+        <a:font script="Thaa" typeface="MV Boli"/>
+        <a:font script="Deva" typeface="Mangal"/>
+        <a:font script="Telu" typeface="Gautami"/>
+        <a:font script="Taml" typeface="Latha"/>
+        <a:font script="Syrc" typeface="Estrangelo Edessa"/>
+        <a:font script="Orya" typeface="Kalinga"/>
+        <a:font script="Mlym" typeface="Kartika"/>
+        <a:font script="Laoo" typeface="DokChampa"/>
+        <a:font script="Sinh" typeface="Iskoola Pota"/>
+        <a:font script="Mong" typeface="Mongolian Baiti"/>
+        <a:font script="Viet" typeface="Arial"/>
+        <a:font script="Uigh" typeface="Microsoft Uighur"/>
+        <a:font script="Geor" typeface="Sylfaen"/>
+        <a:font script="Armn" typeface="Arial"/>
+        <a:font script="Bugi" typeface="Leelawadee UI"/>
+        <a:font script="Bopo" typeface="Microsoft JhengHei"/>
+        <a:font script="Java" typeface="Javanese Text"/>
+        <a:font script="Lisu" typeface="Segoe UI"/>
+        <a:font script="Mymr" typeface="Myanmar Text"/>
+        <a:font script="Nkoo" typeface="Ebrima"/>
+        <a:font script="Olck" typeface="Nirmala UI"/>
+        <a:font script="Osma" typeface="Ebrima"/>
+        <a:font script="Phag" typeface="Phagspa"/>
+        <a:font script="Syrn" typeface="Estrangelo Edessa"/>
+        <a:font script="Syrj" typeface="Estrangelo Edessa"/>
+        <a:font script="Syre" typeface="Estrangelo Edessa"/>
+        <a:font script="Sora" typeface="Nirmala UI"/>
+        <a:font script="Tale" typeface="Microsoft Tai Le"/>
+        <a:font script="Talu" typeface="Microsoft New Tai Lue"/>
+        <a:font script="Tfng" typeface="Ebrima"/>
+      </a:minorFont>
+    </a:fontScheme>
+    <a:fmtScheme name="Office">
+      <a:fillStyleLst>
+        <a:solidFill>
+          <a:schemeClr val="phClr"/>
+        </a:solidFill>
+        <a:gradFill rotWithShape="1">
+          <a:gsLst>
+            <a:gs pos="0">
+              <a:schemeClr val="phClr">
+                <a:lumMod val="110000"/>
+                <a:satMod val="105000"/>
+                <a:tint val="67000"/>
+              </a:schemeClr>
+            </a:gs>
+            <a:gs pos="50000">
+              <a:schemeClr val="phClr">
+                <a:lumMod val="105000"/>
+                <a:satMod val="103000"/>
+                <a:tint val="73000"/>
+              </a:schemeClr>
+            </a:gs>
+            <a:gs pos="100000">
+              <a:schemeClr val="phClr">
+                <a:lumMod val="105000"/>
+                <a:satMod val="109000"/>
+                <a:tint val="81000"/>
+              </a:schemeClr>
+            </a:gs>
+          </a:gsLst>
+          <a:lin ang="5400000" scaled="0"/>
+        </a:gradFill>
+        <a:gradFill rotWithShape="1">
+          <a:gsLst>
+            <a:gs pos="0">
+              <a:schemeClr val="phClr">
+                <a:satMod val="103000"/>
+                <a:lumMod val="102000"/>
+                <a:tint val="94000"/>
+              </a:schemeClr>
+            </a:gs>
+            <a:gs pos="50000">
+              <a:schemeClr val="phClr">
+                <a:satMod val="110000"/>
+                <a:lumMod val="100000"/>
+                <a:shade val="100000"/>
+              </a:schemeClr>
+            </a:gs>
+            <a:gs pos="100000">
+              <a:schemeClr val="phClr">
+                <a:lumMod val="99000"/>
+                <a:satMod val="120000"/>
+                <a:shade val="78000"/>
+              </a:schemeClr>
+            </a:gs>
+          </a:gsLst>
+          <a:lin ang="5400000" scaled="0"/>
+        </a:gradFill>
+      </a:fillStyleLst>
+      <a:lnStyleLst>
+        <a:ln w="6350" cap="flat" cmpd="sng" algn="ctr">
+          <a:solidFill>
+            <a:schemeClr val="phClr"/>
+          </a:solidFill>
+          <a:prstDash val="solid"/>
+          <a:miter lim="800000"/>
+        </a:ln>
+        <a:ln w="12700" cap="flat" cmpd="sng" algn="ctr">
+          <a:solidFill>
+            <a:schemeClr val="phClr"/>
+          </a:solidFill>
+          <a:prstDash val="solid"/>
+          <a:miter lim="800000"/>
+        </a:ln>
+        <a:ln w="19050" cap="flat" cmpd="sng" algn="ctr">
+          <a:solidFill>
+            <a:schemeClr val="phClr"/>
+          </a:solidFill>
+          <a:prstDash val="solid"/>
+          <a:miter lim="800000"/>
+        </a:ln>
+      </a:lnStyleLst>
+      <a:effectStyleLst>
+        <a:effectStyle>
+          <a:effectLst/>
+        </a:effectStyle>
+        <a:effectStyle>
+          <a:effectLst/>
+        </a:effectStyle>
+        <a:effectStyle>
+          <a:effectLst>
+            <a:outerShdw blurRad="57150" dist="19050" dir="5400000" algn="ctr" rotWithShape="0">
+              <a:srgbClr val="000000">
+                <a:alpha val="63000"/>
+              </a:srgbClr>
+            </a:outerShdw>
+          </a:effectLst>
+        </a:effectStyle>
+      </a:effectStyleLst>
+      <a:bgFillStyleLst>
+        <a:solidFill>
+          <a:schemeClr val="phClr"/>
+        </a:solidFill>
+        <a:solidFill>
+          <a:schemeClr val="phClr">
+            <a:tint val="95000"/>
+            <a:satMod val="170000"/>
+          </a:schemeClr>
+        </a:solidFill>
+        <a:gradFill rotWithShape="1">
+          <a:gsLst>
+            <a:gs pos="0">
+              <a:schemeClr val="phClr">
+                <a:tint val="93000"/>
+                <a:satMod val="150000"/>
+                <a:shade val="98000"/>
+                <a:lumMod val="102000"/>
+              </a:schemeClr>
+            </a:gs>
+            <a:gs pos="50000">
+              <a:schemeClr val="phClr">
+                <a:tint val="98000"/>
+                <a:satMod val="130000"/>
+                <a:shade val="90000"/>
+                <a:lumMod val="103000"/>
+              </a:schemeClr>
+            </a:gs>
+            <a:gs pos="100000">
+              <a:schemeClr val="phClr">
+                <a:shade val="63000"/>
+                <a:satMod val="120000"/>
+              </a:schemeClr>
+            </a:gs>
+          </a:gsLst>
+          <a:lin ang="5400000" scaled="0"/>
+        </a:gradFill>
+      </a:bgFillStyleLst>
+    </a:fmtScheme>
+  </a:themeElements>
+  <a:objectDefaults/>
+  <a:extraClrSchemeLst/>
+  <a:extLst>
+    <a:ext uri="{05A4C25C-085E-4340-85A3-A5531E510DB2}">
+      <thm15:themeFamily xmlns:thm15="http://schemas.microsoft.com/office/thememl/2012/main" name="Office Theme" id="{62F939B6-93AF-4DB8-9C6B-D6C7DFDC589F}" vid="{4A3C46E8-61CC-4603-A589-7422A47A8E4A}"/>
+    </a:ext>
+  </a:extLst>
+</a:theme>
 </file>
</xml_diff>

<commit_message>
figs for A/B/C/ model runs
</commit_message>
<xml_diff>
--- a/figs/other/mouselab_meta-mdp.pptx
+++ b/figs/other/mouselab_meta-mdp.pptx
@@ -208,7 +208,7 @@
           <a:p>
             <a:fld id="{1442C147-0AFC-3442-9C27-BDD1766F8F27}" type="datetimeFigureOut">
               <a:rPr lang="en-US" smtClean="0"/>
-              <a:t>7/13/22</a:t>
+              <a:t>7/16/22</a:t>
             </a:fld>
             <a:endParaRPr lang="en-US"/>
           </a:p>
@@ -690,7 +690,7 @@
           <a:p>
             <a:fld id="{3913361B-3EF1-C247-9E4E-4E66352D7B43}" type="datetimeFigureOut">
               <a:rPr lang="en-US" smtClean="0"/>
-              <a:t>7/13/22</a:t>
+              <a:t>7/16/22</a:t>
             </a:fld>
             <a:endParaRPr lang="en-US"/>
           </a:p>
@@ -860,7 +860,7 @@
           <a:p>
             <a:fld id="{3913361B-3EF1-C247-9E4E-4E66352D7B43}" type="datetimeFigureOut">
               <a:rPr lang="en-US" smtClean="0"/>
-              <a:t>7/13/22</a:t>
+              <a:t>7/16/22</a:t>
             </a:fld>
             <a:endParaRPr lang="en-US"/>
           </a:p>
@@ -1040,7 +1040,7 @@
           <a:p>
             <a:fld id="{3913361B-3EF1-C247-9E4E-4E66352D7B43}" type="datetimeFigureOut">
               <a:rPr lang="en-US" smtClean="0"/>
-              <a:t>7/13/22</a:t>
+              <a:t>7/16/22</a:t>
             </a:fld>
             <a:endParaRPr lang="en-US"/>
           </a:p>
@@ -1210,7 +1210,7 @@
           <a:p>
             <a:fld id="{3913361B-3EF1-C247-9E4E-4E66352D7B43}" type="datetimeFigureOut">
               <a:rPr lang="en-US" smtClean="0"/>
-              <a:t>7/13/22</a:t>
+              <a:t>7/16/22</a:t>
             </a:fld>
             <a:endParaRPr lang="en-US"/>
           </a:p>
@@ -1456,7 +1456,7 @@
           <a:p>
             <a:fld id="{3913361B-3EF1-C247-9E4E-4E66352D7B43}" type="datetimeFigureOut">
               <a:rPr lang="en-US" smtClean="0"/>
-              <a:t>7/13/22</a:t>
+              <a:t>7/16/22</a:t>
             </a:fld>
             <a:endParaRPr lang="en-US"/>
           </a:p>
@@ -1688,7 +1688,7 @@
           <a:p>
             <a:fld id="{3913361B-3EF1-C247-9E4E-4E66352D7B43}" type="datetimeFigureOut">
               <a:rPr lang="en-US" smtClean="0"/>
-              <a:t>7/13/22</a:t>
+              <a:t>7/16/22</a:t>
             </a:fld>
             <a:endParaRPr lang="en-US"/>
           </a:p>
@@ -2055,7 +2055,7 @@
           <a:p>
             <a:fld id="{3913361B-3EF1-C247-9E4E-4E66352D7B43}" type="datetimeFigureOut">
               <a:rPr lang="en-US" smtClean="0"/>
-              <a:t>7/13/22</a:t>
+              <a:t>7/16/22</a:t>
             </a:fld>
             <a:endParaRPr lang="en-US"/>
           </a:p>
@@ -2173,7 +2173,7 @@
           <a:p>
             <a:fld id="{3913361B-3EF1-C247-9E4E-4E66352D7B43}" type="datetimeFigureOut">
               <a:rPr lang="en-US" smtClean="0"/>
-              <a:t>7/13/22</a:t>
+              <a:t>7/16/22</a:t>
             </a:fld>
             <a:endParaRPr lang="en-US"/>
           </a:p>
@@ -2268,7 +2268,7 @@
           <a:p>
             <a:fld id="{3913361B-3EF1-C247-9E4E-4E66352D7B43}" type="datetimeFigureOut">
               <a:rPr lang="en-US" smtClean="0"/>
-              <a:t>7/13/22</a:t>
+              <a:t>7/16/22</a:t>
             </a:fld>
             <a:endParaRPr lang="en-US"/>
           </a:p>
@@ -2545,7 +2545,7 @@
           <a:p>
             <a:fld id="{3913361B-3EF1-C247-9E4E-4E66352D7B43}" type="datetimeFigureOut">
               <a:rPr lang="en-US" smtClean="0"/>
-              <a:t>7/13/22</a:t>
+              <a:t>7/16/22</a:t>
             </a:fld>
             <a:endParaRPr lang="en-US"/>
           </a:p>
@@ -2802,7 +2802,7 @@
           <a:p>
             <a:fld id="{3913361B-3EF1-C247-9E4E-4E66352D7B43}" type="datetimeFigureOut">
               <a:rPr lang="en-US" smtClean="0"/>
-              <a:t>7/13/22</a:t>
+              <a:t>7/16/22</a:t>
             </a:fld>
             <a:endParaRPr lang="en-US"/>
           </a:p>
@@ -3015,7 +3015,7 @@
           <a:p>
             <a:fld id="{3913361B-3EF1-C247-9E4E-4E66352D7B43}" type="datetimeFigureOut">
               <a:rPr lang="en-US" smtClean="0"/>
-              <a:t>7/13/22</a:t>
+              <a:t>7/16/22</a:t>
             </a:fld>
             <a:endParaRPr lang="en-US"/>
           </a:p>
@@ -4620,8 +4620,8 @@
           </a:p>
         </p:txBody>
       </p:sp>
-      <mc:AlternateContent xmlns:mc="http://schemas.openxmlformats.org/markup-compatibility/2006">
-        <mc:Choice xmlns:a14="http://schemas.microsoft.com/office/drawing/2010/main" Requires="a14">
+      <mc:AlternateContent xmlns:mc="http://schemas.openxmlformats.org/markup-compatibility/2006" xmlns:a14="http://schemas.microsoft.com/office/drawing/2010/main">
+        <mc:Choice Requires="a14">
           <p:sp>
             <p:nvSpPr>
               <p:cNvPr id="376" name="TextBox 375">
@@ -4691,7 +4691,7 @@
             </p:txBody>
           </p:sp>
         </mc:Choice>
-        <mc:Fallback>
+        <mc:Fallback xmlns="">
           <p:sp>
             <p:nvSpPr>
               <p:cNvPr id="376" name="TextBox 375">
@@ -4736,8 +4736,8 @@
           </p:sp>
         </mc:Fallback>
       </mc:AlternateContent>
-      <mc:AlternateContent xmlns:mc="http://schemas.openxmlformats.org/markup-compatibility/2006">
-        <mc:Choice xmlns:a14="http://schemas.microsoft.com/office/drawing/2010/main" Requires="a14">
+      <mc:AlternateContent xmlns:mc="http://schemas.openxmlformats.org/markup-compatibility/2006" xmlns:a14="http://schemas.microsoft.com/office/drawing/2010/main">
+        <mc:Choice Requires="a14">
           <p:sp>
             <p:nvSpPr>
               <p:cNvPr id="386" name="TextBox 385">
@@ -4787,7 +4787,7 @@
             </p:txBody>
           </p:sp>
         </mc:Choice>
-        <mc:Fallback>
+        <mc:Fallback xmlns="">
           <p:sp>
             <p:nvSpPr>
               <p:cNvPr id="386" name="TextBox 385">
@@ -4994,8 +4994,8 @@
           </a:prstGeom>
         </p:spPr>
       </p:pic>
-      <mc:AlternateContent xmlns:mc="http://schemas.openxmlformats.org/markup-compatibility/2006">
-        <mc:Choice xmlns:a14="http://schemas.microsoft.com/office/drawing/2010/main" Requires="a14">
+      <mc:AlternateContent xmlns:mc="http://schemas.openxmlformats.org/markup-compatibility/2006" xmlns:a14="http://schemas.microsoft.com/office/drawing/2010/main">
+        <mc:Choice Requires="a14">
           <p:sp>
             <p:nvSpPr>
               <p:cNvPr id="410" name="TextBox 409">
@@ -5071,7 +5071,7 @@
             </p:txBody>
           </p:sp>
         </mc:Choice>
-        <mc:Fallback>
+        <mc:Fallback xmlns="">
           <p:sp>
             <p:nvSpPr>
               <p:cNvPr id="410" name="TextBox 409">
@@ -6276,8 +6276,8 @@
           </a:prstGeom>
         </p:spPr>
       </p:pic>
-      <mc:AlternateContent xmlns:mc="http://schemas.openxmlformats.org/markup-compatibility/2006">
-        <mc:Choice xmlns:a14="http://schemas.microsoft.com/office/drawing/2010/main" Requires="a14">
+      <mc:AlternateContent xmlns:mc="http://schemas.openxmlformats.org/markup-compatibility/2006" xmlns:a14="http://schemas.microsoft.com/office/drawing/2010/main">
+        <mc:Choice Requires="a14">
           <p:sp>
             <p:nvSpPr>
               <p:cNvPr id="148" name="TextBox 147">
@@ -6346,7 +6346,7 @@
             </p:txBody>
           </p:sp>
         </mc:Choice>
-        <mc:Fallback>
+        <mc:Fallback xmlns="">
           <p:sp>
             <p:nvSpPr>
               <p:cNvPr id="148" name="TextBox 147">
@@ -6604,7 +6604,7 @@
         </p:nvCxnSpPr>
         <p:spPr>
           <a:xfrm>
-            <a:off x="7203875" y="2538838"/>
+            <a:off x="7196675" y="2538838"/>
             <a:ext cx="2609619" cy="0"/>
           </a:xfrm>
           <a:prstGeom prst="straightConnector1">
@@ -6632,8 +6632,8 @@
           </a:fontRef>
         </p:style>
       </p:cxnSp>
-      <mc:AlternateContent xmlns:mc="http://schemas.openxmlformats.org/markup-compatibility/2006">
-        <mc:Choice xmlns:a14="http://schemas.microsoft.com/office/drawing/2010/main" Requires="a14">
+      <mc:AlternateContent xmlns:mc="http://schemas.openxmlformats.org/markup-compatibility/2006" xmlns:a14="http://schemas.microsoft.com/office/drawing/2010/main">
+        <mc:Choice Requires="a14">
           <p:sp>
             <p:nvSpPr>
               <p:cNvPr id="170" name="TextBox 169">
@@ -6702,7 +6702,7 @@
             </p:txBody>
           </p:sp>
         </mc:Choice>
-        <mc:Fallback>
+        <mc:Fallback xmlns="">
           <p:sp>
             <p:nvSpPr>
               <p:cNvPr id="170" name="TextBox 169">
@@ -6747,138 +6747,6 @@
           </p:sp>
         </mc:Fallback>
       </mc:AlternateContent>
-      <p:grpSp>
-        <p:nvGrpSpPr>
-          <p:cNvPr id="171" name="Group 170">
-            <a:extLst>
-              <a:ext uri="{FF2B5EF4-FFF2-40B4-BE49-F238E27FC236}">
-                <a16:creationId xmlns:a16="http://schemas.microsoft.com/office/drawing/2014/main" id="{D00D6232-0C96-8B4C-9528-D6BF7857696C}"/>
-              </a:ext>
-            </a:extLst>
-          </p:cNvPr>
-          <p:cNvGrpSpPr/>
-          <p:nvPr/>
-        </p:nvGrpSpPr>
-        <p:grpSpPr>
-          <a:xfrm>
-            <a:off x="11279826" y="2251483"/>
-            <a:ext cx="1675354" cy="907085"/>
-            <a:chOff x="1197234" y="14329953"/>
-            <a:chExt cx="1675354" cy="907085"/>
-          </a:xfrm>
-        </p:grpSpPr>
-        <p:grpSp>
-          <p:nvGrpSpPr>
-            <p:cNvPr id="172" name="Group 171">
-              <a:extLst>
-                <a:ext uri="{FF2B5EF4-FFF2-40B4-BE49-F238E27FC236}">
-                  <a16:creationId xmlns:a16="http://schemas.microsoft.com/office/drawing/2014/main" id="{804DB358-212A-0341-8186-D8B9CC336EBF}"/>
-                </a:ext>
-              </a:extLst>
-            </p:cNvPr>
-            <p:cNvGrpSpPr>
-              <a:grpSpLocks noChangeAspect="1"/>
-            </p:cNvGrpSpPr>
-            <p:nvPr/>
-          </p:nvGrpSpPr>
-          <p:grpSpPr>
-            <a:xfrm>
-              <a:off x="1197234" y="14329953"/>
-              <a:ext cx="1675354" cy="907085"/>
-              <a:chOff x="7098837" y="5416165"/>
-              <a:chExt cx="2094192" cy="1133856"/>
-            </a:xfrm>
-          </p:grpSpPr>
-          <p:pic>
-            <p:nvPicPr>
-              <p:cNvPr id="175" name="Picture 174">
-                <a:extLst>
-                  <a:ext uri="{FF2B5EF4-FFF2-40B4-BE49-F238E27FC236}">
-                    <a16:creationId xmlns:a16="http://schemas.microsoft.com/office/drawing/2014/main" id="{D81CA682-19C0-EF47-871D-78BDAB7BC210}"/>
-                  </a:ext>
-                </a:extLst>
-              </p:cNvPr>
-              <p:cNvPicPr>
-                <a:picLocks noChangeAspect="1"/>
-              </p:cNvPicPr>
-              <p:nvPr/>
-            </p:nvPicPr>
-            <p:blipFill rotWithShape="1">
-              <a:blip r:embed="rId4"/>
-              <a:srcRect l="28579" t="79553" r="57039"/>
-              <a:stretch/>
-            </p:blipFill>
-            <p:spPr>
-              <a:xfrm>
-                <a:off x="7992908" y="5864581"/>
-                <a:ext cx="302122" cy="233179"/>
-              </a:xfrm>
-              <a:prstGeom prst="rect">
-                <a:avLst/>
-              </a:prstGeom>
-            </p:spPr>
-          </p:pic>
-          <p:pic>
-            <p:nvPicPr>
-              <p:cNvPr id="174" name="Picture 173">
-                <a:extLst>
-                  <a:ext uri="{FF2B5EF4-FFF2-40B4-BE49-F238E27FC236}">
-                    <a16:creationId xmlns:a16="http://schemas.microsoft.com/office/drawing/2014/main" id="{B14538A4-F33A-8F41-8540-63067070B6FE}"/>
-                  </a:ext>
-                </a:extLst>
-              </p:cNvPr>
-              <p:cNvPicPr>
-                <a:picLocks noChangeAspect="1"/>
-              </p:cNvPicPr>
-              <p:nvPr/>
-            </p:nvPicPr>
-            <p:blipFill>
-              <a:blip r:embed="rId3"/>
-              <a:stretch>
-                <a:fillRect/>
-              </a:stretch>
-            </p:blipFill>
-            <p:spPr>
-              <a:xfrm>
-                <a:off x="7098837" y="5416165"/>
-                <a:ext cx="2094192" cy="1133856"/>
-              </a:xfrm>
-              <a:prstGeom prst="rect">
-                <a:avLst/>
-              </a:prstGeom>
-            </p:spPr>
-          </p:pic>
-        </p:grpSp>
-        <p:pic>
-          <p:nvPicPr>
-            <p:cNvPr id="173" name="Picture 172">
-              <a:extLst>
-                <a:ext uri="{FF2B5EF4-FFF2-40B4-BE49-F238E27FC236}">
-                  <a16:creationId xmlns:a16="http://schemas.microsoft.com/office/drawing/2014/main" id="{25047DF3-2610-AB45-9648-D248AD857FAF}"/>
-                </a:ext>
-              </a:extLst>
-            </p:cNvPr>
-            <p:cNvPicPr>
-              <a:picLocks noChangeAspect="1"/>
-            </p:cNvPicPr>
-            <p:nvPr/>
-          </p:nvPicPr>
-          <p:blipFill rotWithShape="1">
-            <a:blip r:embed="rId4"/>
-            <a:srcRect l="57222" t="20338" r="28746" b="60144"/>
-            <a:stretch/>
-          </p:blipFill>
-          <p:spPr>
-            <a:xfrm>
-              <a:off x="1912856" y="14870815"/>
-              <a:ext cx="237015" cy="178968"/>
-            </a:xfrm>
-            <a:prstGeom prst="rect">
-              <a:avLst/>
-            </a:prstGeom>
-          </p:spPr>
-        </p:pic>
-      </p:grpSp>
       <p:cxnSp>
         <p:nvCxnSpPr>
           <p:cNvPr id="183" name="Straight Arrow Connector 182">
@@ -6895,7 +6763,7 @@
         </p:nvCxnSpPr>
         <p:spPr>
           <a:xfrm>
-            <a:off x="13135156" y="2545283"/>
+            <a:off x="13142356" y="2545283"/>
             <a:ext cx="2609619" cy="0"/>
           </a:xfrm>
           <a:prstGeom prst="straightConnector1">
@@ -6983,7 +6851,7 @@
         </p:nvCxnSpPr>
         <p:spPr>
           <a:xfrm flipV="1">
-            <a:off x="9268062" y="3313913"/>
+            <a:off x="9275262" y="3313913"/>
             <a:ext cx="816724" cy="720282"/>
           </a:xfrm>
           <a:prstGeom prst="straightConnector1">
@@ -8072,6 +7940,188 @@
           </a:p>
         </p:txBody>
       </p:sp>
+      <p:grpSp>
+        <p:nvGrpSpPr>
+          <p:cNvPr id="6" name="Group 5">
+            <a:extLst>
+              <a:ext uri="{FF2B5EF4-FFF2-40B4-BE49-F238E27FC236}">
+                <a16:creationId xmlns:a16="http://schemas.microsoft.com/office/drawing/2014/main" id="{26C44D04-9AC2-2945-8C40-59BEF9754CCB}"/>
+              </a:ext>
+            </a:extLst>
+          </p:cNvPr>
+          <p:cNvGrpSpPr/>
+          <p:nvPr/>
+        </p:nvGrpSpPr>
+        <p:grpSpPr>
+          <a:xfrm>
+            <a:off x="11279826" y="2251483"/>
+            <a:ext cx="1675354" cy="907085"/>
+            <a:chOff x="11279826" y="2251483"/>
+            <a:chExt cx="1675354" cy="907085"/>
+          </a:xfrm>
+        </p:grpSpPr>
+        <p:grpSp>
+          <p:nvGrpSpPr>
+            <p:cNvPr id="171" name="Group 170">
+              <a:extLst>
+                <a:ext uri="{FF2B5EF4-FFF2-40B4-BE49-F238E27FC236}">
+                  <a16:creationId xmlns:a16="http://schemas.microsoft.com/office/drawing/2014/main" id="{D00D6232-0C96-8B4C-9528-D6BF7857696C}"/>
+                </a:ext>
+              </a:extLst>
+            </p:cNvPr>
+            <p:cNvGrpSpPr/>
+            <p:nvPr/>
+          </p:nvGrpSpPr>
+          <p:grpSpPr>
+            <a:xfrm>
+              <a:off x="11279826" y="2251483"/>
+              <a:ext cx="1675354" cy="907085"/>
+              <a:chOff x="1197234" y="14329953"/>
+              <a:chExt cx="1675354" cy="907085"/>
+            </a:xfrm>
+          </p:grpSpPr>
+          <p:grpSp>
+            <p:nvGrpSpPr>
+              <p:cNvPr id="172" name="Group 171">
+                <a:extLst>
+                  <a:ext uri="{FF2B5EF4-FFF2-40B4-BE49-F238E27FC236}">
+                    <a16:creationId xmlns:a16="http://schemas.microsoft.com/office/drawing/2014/main" id="{804DB358-212A-0341-8186-D8B9CC336EBF}"/>
+                  </a:ext>
+                </a:extLst>
+              </p:cNvPr>
+              <p:cNvGrpSpPr>
+                <a:grpSpLocks noChangeAspect="1"/>
+              </p:cNvGrpSpPr>
+              <p:nvPr/>
+            </p:nvGrpSpPr>
+            <p:grpSpPr>
+              <a:xfrm>
+                <a:off x="1197234" y="14329953"/>
+                <a:ext cx="1675354" cy="907085"/>
+                <a:chOff x="7098837" y="5416165"/>
+                <a:chExt cx="2094192" cy="1133856"/>
+              </a:xfrm>
+            </p:grpSpPr>
+            <p:pic>
+              <p:nvPicPr>
+                <p:cNvPr id="175" name="Picture 174">
+                  <a:extLst>
+                    <a:ext uri="{FF2B5EF4-FFF2-40B4-BE49-F238E27FC236}">
+                      <a16:creationId xmlns:a16="http://schemas.microsoft.com/office/drawing/2014/main" id="{D81CA682-19C0-EF47-871D-78BDAB7BC210}"/>
+                    </a:ext>
+                  </a:extLst>
+                </p:cNvPr>
+                <p:cNvPicPr>
+                  <a:picLocks noChangeAspect="1"/>
+                </p:cNvPicPr>
+                <p:nvPr/>
+              </p:nvPicPr>
+              <p:blipFill rotWithShape="1">
+                <a:blip r:embed="rId4"/>
+                <a:srcRect l="28579" t="79553" r="57039"/>
+                <a:stretch/>
+              </p:blipFill>
+              <p:spPr>
+                <a:xfrm>
+                  <a:off x="7992908" y="5864581"/>
+                  <a:ext cx="302122" cy="233179"/>
+                </a:xfrm>
+                <a:prstGeom prst="rect">
+                  <a:avLst/>
+                </a:prstGeom>
+              </p:spPr>
+            </p:pic>
+            <p:pic>
+              <p:nvPicPr>
+                <p:cNvPr id="174" name="Picture 173">
+                  <a:extLst>
+                    <a:ext uri="{FF2B5EF4-FFF2-40B4-BE49-F238E27FC236}">
+                      <a16:creationId xmlns:a16="http://schemas.microsoft.com/office/drawing/2014/main" id="{B14538A4-F33A-8F41-8540-63067070B6FE}"/>
+                    </a:ext>
+                  </a:extLst>
+                </p:cNvPr>
+                <p:cNvPicPr>
+                  <a:picLocks noChangeAspect="1"/>
+                </p:cNvPicPr>
+                <p:nvPr/>
+              </p:nvPicPr>
+              <p:blipFill>
+                <a:blip r:embed="rId3"/>
+                <a:stretch>
+                  <a:fillRect/>
+                </a:stretch>
+              </p:blipFill>
+              <p:spPr>
+                <a:xfrm>
+                  <a:off x="7098837" y="5416165"/>
+                  <a:ext cx="2094192" cy="1133856"/>
+                </a:xfrm>
+                <a:prstGeom prst="rect">
+                  <a:avLst/>
+                </a:prstGeom>
+              </p:spPr>
+            </p:pic>
+          </p:grpSp>
+          <p:pic>
+            <p:nvPicPr>
+              <p:cNvPr id="173" name="Picture 172">
+                <a:extLst>
+                  <a:ext uri="{FF2B5EF4-FFF2-40B4-BE49-F238E27FC236}">
+                    <a16:creationId xmlns:a16="http://schemas.microsoft.com/office/drawing/2014/main" id="{25047DF3-2610-AB45-9648-D248AD857FAF}"/>
+                  </a:ext>
+                </a:extLst>
+              </p:cNvPr>
+              <p:cNvPicPr>
+                <a:picLocks noChangeAspect="1"/>
+              </p:cNvPicPr>
+              <p:nvPr/>
+            </p:nvPicPr>
+            <p:blipFill rotWithShape="1">
+              <a:blip r:embed="rId4"/>
+              <a:srcRect l="57222" t="20338" r="28746" b="60144"/>
+              <a:stretch/>
+            </p:blipFill>
+            <p:spPr>
+              <a:xfrm>
+                <a:off x="1912856" y="14870815"/>
+                <a:ext cx="237015" cy="178968"/>
+              </a:xfrm>
+              <a:prstGeom prst="rect">
+                <a:avLst/>
+              </a:prstGeom>
+            </p:spPr>
+          </p:pic>
+        </p:grpSp>
+        <p:pic>
+          <p:nvPicPr>
+            <p:cNvPr id="123" name="Picture 122">
+              <a:extLst>
+                <a:ext uri="{FF2B5EF4-FFF2-40B4-BE49-F238E27FC236}">
+                  <a16:creationId xmlns:a16="http://schemas.microsoft.com/office/drawing/2014/main" id="{2182D7B2-4462-4E47-9572-86DC590CBC5F}"/>
+                </a:ext>
+              </a:extLst>
+            </p:cNvPr>
+            <p:cNvPicPr>
+              <a:picLocks noChangeAspect="1"/>
+            </p:cNvPicPr>
+            <p:nvPr/>
+          </p:nvPicPr>
+          <p:blipFill rotWithShape="1">
+            <a:blip r:embed="rId4"/>
+            <a:srcRect l="28579" t="79553" r="57039"/>
+            <a:stretch/>
+          </p:blipFill>
+          <p:spPr>
+            <a:xfrm>
+              <a:off x="11995448" y="2613012"/>
+              <a:ext cx="241698" cy="186543"/>
+            </a:xfrm>
+            <a:prstGeom prst="rect">
+              <a:avLst/>
+            </a:prstGeom>
+          </p:spPr>
+        </p:pic>
+      </p:grpSp>
     </p:spTree>
     <p:extLst>
       <p:ext uri="{BB962C8B-B14F-4D97-AF65-F5344CB8AC3E}">

</xml_diff>